<commit_message>
Lesson 1 and 2 Notes
</commit_message>
<xml_diff>
--- a/Complimentary Course Content/Module7/Lessons/Module7_Lesson1 What is DevOps.pptx
+++ b/Complimentary Course Content/Module7/Lessons/Module7_Lesson1 What is DevOps.pptx
@@ -6,24 +6,25 @@
     <p:sldMasterId id="2147483660" r:id="rId2"/>
   </p:sldMasterIdLst>
   <p:notesMasterIdLst>
-    <p:notesMasterId r:id="rId18"/>
+    <p:notesMasterId r:id="rId19"/>
   </p:notesMasterIdLst>
   <p:sldIdLst>
     <p:sldId id="256" r:id="rId3"/>
-    <p:sldId id="318" r:id="rId4"/>
-    <p:sldId id="322" r:id="rId5"/>
-    <p:sldId id="298" r:id="rId6"/>
-    <p:sldId id="329" r:id="rId7"/>
-    <p:sldId id="321" r:id="rId8"/>
-    <p:sldId id="299" r:id="rId9"/>
-    <p:sldId id="323" r:id="rId10"/>
-    <p:sldId id="324" r:id="rId11"/>
-    <p:sldId id="325" r:id="rId12"/>
-    <p:sldId id="326" r:id="rId13"/>
-    <p:sldId id="327" r:id="rId14"/>
-    <p:sldId id="328" r:id="rId15"/>
-    <p:sldId id="313" r:id="rId16"/>
-    <p:sldId id="319" r:id="rId17"/>
+    <p:sldId id="330" r:id="rId4"/>
+    <p:sldId id="318" r:id="rId5"/>
+    <p:sldId id="322" r:id="rId6"/>
+    <p:sldId id="298" r:id="rId7"/>
+    <p:sldId id="329" r:id="rId8"/>
+    <p:sldId id="321" r:id="rId9"/>
+    <p:sldId id="299" r:id="rId10"/>
+    <p:sldId id="323" r:id="rId11"/>
+    <p:sldId id="324" r:id="rId12"/>
+    <p:sldId id="325" r:id="rId13"/>
+    <p:sldId id="326" r:id="rId14"/>
+    <p:sldId id="327" r:id="rId15"/>
+    <p:sldId id="328" r:id="rId16"/>
+    <p:sldId id="313" r:id="rId17"/>
+    <p:sldId id="319" r:id="rId18"/>
   </p:sldIdLst>
   <p:sldSz cx="12192000" cy="6858000"/>
   <p:notesSz cx="6858000" cy="9144000"/>
@@ -124,7 +125,7 @@
   </p:defaultTextStyle>
   <p:extLst>
     <p:ext uri="{EFAFB233-063F-42B5-8137-9DF3F51BA10A}">
-      <p15:sldGuideLst xmlns="" xmlns:p15="http://schemas.microsoft.com/office/powerpoint/2012/main">
+      <p15:sldGuideLst xmlns:p15="http://schemas.microsoft.com/office/powerpoint/2012/main" xmlns="">
         <p15:guide id="1" orient="horz" pos="2184" userDrawn="1">
           <p15:clr>
             <a:srgbClr val="A4A3A4"/>
@@ -343,7 +344,7 @@
             <a:fld id="{49B60EF2-7028-489F-85D8-FE86CD7CF2A0}" type="datetimeFigureOut">
               <a:rPr lang="en-US" smtClean="0"/>
               <a:pPr/>
-              <a:t>5/20/16</a:t>
+              <a:t>6/29/16</a:t>
             </a:fld>
             <a:endParaRPr lang="en-US"/>
           </a:p>
@@ -757,14 +758,6 @@
               <a:tabLst/>
               <a:defRPr/>
             </a:pPr>
-            <a:r>
-              <a:rPr lang="en-US" b="1" dirty="0"/>
-              <a:t>Notes</a:t>
-            </a:r>
-            <a:r>
-              <a:rPr lang="en-US" b="1" dirty="0" smtClean="0"/>
-              <a:t>:</a:t>
-            </a:r>
             <a:endParaRPr lang="en-US" b="1" dirty="0"/>
           </a:p>
         </p:txBody>
@@ -867,14 +860,138 @@
               <a:defRPr/>
             </a:pPr>
             <a:r>
-              <a:rPr lang="en-US" b="1" dirty="0"/>
-              <a:t>Notes</a:t>
-            </a:r>
-            <a:r>
               <a:rPr lang="en-US" b="1" dirty="0" smtClean="0"/>
-              <a:t>:</a:t>
-            </a:r>
-            <a:endParaRPr lang="en-US" b="1" dirty="0"/>
+              <a:t>Notes:</a:t>
+            </a:r>
+          </a:p>
+          <a:p>
+            <a:pPr marL="228600" marR="0" lvl="0" indent="-228600" algn="l" defTabSz="914400" rtl="0" eaLnBrk="1" fontAlgn="auto" latinLnBrk="0" hangingPunct="1">
+              <a:lnSpc>
+                <a:spcPct val="100000"/>
+              </a:lnSpc>
+              <a:spcBef>
+                <a:spcPts val="0"/>
+              </a:spcBef>
+              <a:spcAft>
+                <a:spcPts val="0"/>
+              </a:spcAft>
+              <a:buClrTx/>
+              <a:buSzTx/>
+              <a:buFont typeface="Arial"/>
+              <a:buChar char="•"/>
+              <a:tabLst/>
+              <a:defRPr/>
+            </a:pPr>
+            <a:r>
+              <a:rPr lang="en-US" b="0" dirty="0" smtClean="0"/>
+              <a:t>Global</a:t>
+            </a:r>
+            <a:r>
+              <a:rPr lang="en-US" b="0" baseline="0" dirty="0" smtClean="0"/>
+              <a:t> collaboration examples are: CVS, SVN, Mercurial and </a:t>
+            </a:r>
+            <a:r>
+              <a:rPr lang="en-US" b="0" baseline="0" dirty="0" err="1" smtClean="0"/>
+              <a:t>Git</a:t>
+            </a:r>
+            <a:r>
+              <a:rPr lang="en-US" b="0" baseline="0" dirty="0" smtClean="0"/>
+              <a:t>.  </a:t>
+            </a:r>
+            <a:r>
+              <a:rPr lang="en-US" b="0" baseline="0" dirty="0" err="1" smtClean="0"/>
+              <a:t>Git</a:t>
+            </a:r>
+            <a:r>
+              <a:rPr lang="en-US" b="0" baseline="0" dirty="0" smtClean="0"/>
+              <a:t> being the current most-popular platform</a:t>
+            </a:r>
+          </a:p>
+          <a:p>
+            <a:pPr marL="228600" marR="0" lvl="0" indent="-228600" algn="l" defTabSz="914400" rtl="0" eaLnBrk="1" fontAlgn="auto" latinLnBrk="0" hangingPunct="1">
+              <a:lnSpc>
+                <a:spcPct val="100000"/>
+              </a:lnSpc>
+              <a:spcBef>
+                <a:spcPts val="0"/>
+              </a:spcBef>
+              <a:spcAft>
+                <a:spcPts val="0"/>
+              </a:spcAft>
+              <a:buClrTx/>
+              <a:buSzTx/>
+              <a:buFont typeface="Arial"/>
+              <a:buChar char="•"/>
+              <a:tabLst/>
+              <a:defRPr/>
+            </a:pPr>
+            <a:r>
+              <a:rPr lang="en-US" b="0" baseline="0" dirty="0" smtClean="0"/>
+              <a:t>Hardening of code through testing: See the last lesson in the Module on testing</a:t>
+            </a:r>
+          </a:p>
+          <a:p>
+            <a:pPr marL="228600" marR="0" lvl="0" indent="-228600" algn="l" defTabSz="914400" rtl="0" eaLnBrk="1" fontAlgn="auto" latinLnBrk="0" hangingPunct="1">
+              <a:lnSpc>
+                <a:spcPct val="100000"/>
+              </a:lnSpc>
+              <a:spcBef>
+                <a:spcPts val="0"/>
+              </a:spcBef>
+              <a:spcAft>
+                <a:spcPts val="0"/>
+              </a:spcAft>
+              <a:buClrTx/>
+              <a:buSzTx/>
+              <a:buFont typeface="Arial"/>
+              <a:buChar char="•"/>
+              <a:tabLst/>
+              <a:defRPr/>
+            </a:pPr>
+            <a:r>
+              <a:rPr lang="en-US" b="0" baseline="0" dirty="0" smtClean="0"/>
+              <a:t>Version control examples are: CVS, SVN, Mercurial and </a:t>
+            </a:r>
+            <a:r>
+              <a:rPr lang="en-US" b="0" baseline="0" dirty="0" err="1" smtClean="0"/>
+              <a:t>Git</a:t>
+            </a:r>
+            <a:r>
+              <a:rPr lang="en-US" b="0" baseline="0" dirty="0" smtClean="0"/>
+              <a:t>.  </a:t>
+            </a:r>
+            <a:r>
+              <a:rPr lang="en-US" b="0" baseline="0" dirty="0" err="1" smtClean="0"/>
+              <a:t>Git</a:t>
+            </a:r>
+            <a:r>
+              <a:rPr lang="en-US" b="0" baseline="0" dirty="0" smtClean="0"/>
+              <a:t> being the current most-popular platform</a:t>
+            </a:r>
+          </a:p>
+          <a:p>
+            <a:pPr marL="228600" marR="0" lvl="0" indent="-228600" algn="l" defTabSz="914400" rtl="0" eaLnBrk="1" fontAlgn="auto" latinLnBrk="0" hangingPunct="1">
+              <a:lnSpc>
+                <a:spcPct val="100000"/>
+              </a:lnSpc>
+              <a:spcBef>
+                <a:spcPts val="0"/>
+              </a:spcBef>
+              <a:spcAft>
+                <a:spcPts val="0"/>
+              </a:spcAft>
+              <a:buClrTx/>
+              <a:buSzTx/>
+              <a:buFont typeface="Arial"/>
+              <a:buChar char="•"/>
+              <a:tabLst/>
+              <a:defRPr/>
+            </a:pPr>
+            <a:r>
+              <a:rPr lang="en-US" b="0" baseline="0" dirty="0" smtClean="0"/>
+              <a:t>Modularity of code example:  Object Oriented programming</a:t>
+            </a:r>
+            <a:endParaRPr lang="en-US" b="0" baseline="0" dirty="0" smtClean="0"/>
           </a:p>
         </p:txBody>
       </p:sp>
@@ -983,6 +1100,48 @@
               <a:rPr lang="en-US" b="1" dirty="0" smtClean="0"/>
               <a:t>:</a:t>
             </a:r>
+          </a:p>
+          <a:p>
+            <a:pPr marL="171450" marR="0" lvl="0" indent="-171450" algn="l" defTabSz="914400" rtl="0" eaLnBrk="1" fontAlgn="auto" latinLnBrk="0" hangingPunct="1">
+              <a:lnSpc>
+                <a:spcPct val="100000"/>
+              </a:lnSpc>
+              <a:spcBef>
+                <a:spcPts val="0"/>
+              </a:spcBef>
+              <a:spcAft>
+                <a:spcPts val="0"/>
+              </a:spcAft>
+              <a:buClrTx/>
+              <a:buSzTx/>
+              <a:buFont typeface="Arial"/>
+              <a:buChar char="•"/>
+              <a:tabLst/>
+              <a:defRPr/>
+            </a:pPr>
+            <a:r>
+              <a:rPr lang="en-US" b="0" baseline="0" dirty="0" smtClean="0"/>
+              <a:t>Operations has been slow to adopt development tools and methodologies but this adoption is gaining momentum.</a:t>
+            </a:r>
+          </a:p>
+          <a:p>
+            <a:pPr marL="0" marR="0" lvl="0" indent="0" algn="l" defTabSz="914400" rtl="0" eaLnBrk="1" fontAlgn="auto" latinLnBrk="0" hangingPunct="1">
+              <a:lnSpc>
+                <a:spcPct val="100000"/>
+              </a:lnSpc>
+              <a:spcBef>
+                <a:spcPts val="0"/>
+              </a:spcBef>
+              <a:spcAft>
+                <a:spcPts val="0"/>
+              </a:spcAft>
+              <a:buClrTx/>
+              <a:buSzTx/>
+              <a:buFontTx/>
+              <a:buNone/>
+              <a:tabLst/>
+              <a:defRPr/>
+            </a:pPr>
             <a:endParaRPr lang="en-US" b="1" dirty="0"/>
           </a:p>
         </p:txBody>
@@ -1092,6 +1251,56 @@
               <a:rPr lang="en-US" b="1" dirty="0" smtClean="0"/>
               <a:t>:</a:t>
             </a:r>
+          </a:p>
+          <a:p>
+            <a:pPr marL="171450" marR="0" lvl="0" indent="-171450" algn="l" defTabSz="914400" rtl="0" eaLnBrk="1" fontAlgn="auto" latinLnBrk="0" hangingPunct="1">
+              <a:lnSpc>
+                <a:spcPct val="100000"/>
+              </a:lnSpc>
+              <a:spcBef>
+                <a:spcPts val="0"/>
+              </a:spcBef>
+              <a:spcAft>
+                <a:spcPts val="0"/>
+              </a:spcAft>
+              <a:buClrTx/>
+              <a:buSzTx/>
+              <a:buFont typeface="Arial"/>
+              <a:buChar char="•"/>
+              <a:tabLst/>
+              <a:defRPr/>
+            </a:pPr>
+            <a:r>
+              <a:rPr lang="en-US" b="0" dirty="0" smtClean="0"/>
+              <a:t>As companies seek to find more productivity gains while spending less money, Operations has been pushed into accepting and furthering the </a:t>
+            </a:r>
+            <a:r>
+              <a:rPr lang="en-US" b="0" dirty="0" err="1" smtClean="0"/>
+              <a:t>DevOps</a:t>
+            </a:r>
+            <a:r>
+              <a:rPr lang="en-US" b="0" dirty="0" smtClean="0"/>
+              <a:t> model.</a:t>
+            </a:r>
+          </a:p>
+          <a:p>
+            <a:pPr marL="0" marR="0" lvl="0" indent="0" algn="l" defTabSz="914400" rtl="0" eaLnBrk="1" fontAlgn="auto" latinLnBrk="0" hangingPunct="1">
+              <a:lnSpc>
+                <a:spcPct val="100000"/>
+              </a:lnSpc>
+              <a:spcBef>
+                <a:spcPts val="0"/>
+              </a:spcBef>
+              <a:spcAft>
+                <a:spcPts val="0"/>
+              </a:spcAft>
+              <a:buClrTx/>
+              <a:buSzTx/>
+              <a:buFontTx/>
+              <a:buNone/>
+              <a:tabLst/>
+              <a:defRPr/>
+            </a:pPr>
             <a:endParaRPr lang="en-US" b="1" dirty="0"/>
           </a:p>
         </p:txBody>
@@ -1194,18 +1403,16 @@
               <a:defRPr/>
             </a:pPr>
             <a:r>
-              <a:rPr lang="en-US" dirty="0"/>
-              <a:t>Answer: c</a:t>
-            </a:r>
-            <a:endParaRPr lang="en-US" u="sng" dirty="0">
-              <a:solidFill>
-                <a:schemeClr val="hlink"/>
-              </a:solidFill>
-              <a:hlinkClick r:id="rId3"/>
-            </a:endParaRPr>
-          </a:p>
-          <a:p>
-            <a:pPr marL="0" marR="0" lvl="0" indent="0" algn="l" defTabSz="914400" rtl="0" eaLnBrk="1" fontAlgn="auto" latinLnBrk="0" hangingPunct="1">
+              <a:rPr lang="en-US" b="1" dirty="0"/>
+              <a:t>Notes</a:t>
+            </a:r>
+            <a:r>
+              <a:rPr lang="en-US" b="1" dirty="0" smtClean="0"/>
+              <a:t>:</a:t>
+            </a:r>
+          </a:p>
+          <a:p>
+            <a:pPr marL="171450" marR="0" lvl="0" indent="-171450" algn="l" defTabSz="914400" rtl="0" eaLnBrk="1" fontAlgn="auto" latinLnBrk="0" hangingPunct="1">
               <a:lnSpc>
                 <a:spcPct val="100000"/>
               </a:lnSpc>
@@ -1217,16 +1424,51 @@
               </a:spcAft>
               <a:buClrTx/>
               <a:buSzTx/>
-              <a:buFontTx/>
-              <a:buNone/>
+              <a:buFont typeface="Arial"/>
+              <a:buChar char="•"/>
               <a:tabLst/>
               <a:defRPr/>
             </a:pPr>
-            <a:endParaRPr lang="en-US" u="none" dirty="0">
-              <a:solidFill>
-                <a:schemeClr val="hlink"/>
-              </a:solidFill>
-            </a:endParaRPr>
+            <a:r>
+              <a:rPr lang="en-US" b="0" dirty="0" smtClean="0"/>
+              <a:t>The enterprise has moved </a:t>
+            </a:r>
+            <a:r>
+              <a:rPr lang="en-US" b="0" dirty="0" err="1" smtClean="0"/>
+              <a:t>DevOps</a:t>
+            </a:r>
+            <a:r>
+              <a:rPr lang="en-US" b="0" dirty="0" smtClean="0"/>
+              <a:t> into</a:t>
+            </a:r>
+            <a:r>
+              <a:rPr lang="en-US" b="0" baseline="0" dirty="0" smtClean="0"/>
+              <a:t> the mainstream.  When an organization the size of </a:t>
+            </a:r>
+            <a:r>
+              <a:rPr lang="en-US" b="0" baseline="0" dirty="0" err="1" smtClean="0"/>
+              <a:t>Nordstroms</a:t>
+            </a:r>
+            <a:r>
+              <a:rPr lang="en-US" b="0" baseline="0" dirty="0" smtClean="0"/>
+              <a:t>, Google or Facebook wants to manage thousands of servers at scale, </a:t>
+            </a:r>
+            <a:r>
+              <a:rPr lang="en-US" b="0" baseline="0" dirty="0" err="1" smtClean="0"/>
+              <a:t>DevOps</a:t>
+            </a:r>
+            <a:r>
+              <a:rPr lang="en-US" b="0" baseline="0" dirty="0" smtClean="0"/>
+              <a:t> becomes a must-implement methodology.  This technology is then available for smaller organizations who can also benefit from </a:t>
+            </a:r>
+            <a:r>
+              <a:rPr lang="en-US" b="0" baseline="0" dirty="0" err="1" smtClean="0"/>
+              <a:t>DevOps</a:t>
+            </a:r>
+            <a:r>
+              <a:rPr lang="en-US" b="0" baseline="0" dirty="0" smtClean="0"/>
+              <a:t>.</a:t>
+            </a:r>
           </a:p>
         </p:txBody>
       </p:sp>
@@ -1256,7 +1498,7 @@
     </p:spTree>
     <p:extLst>
       <p:ext uri="{BB962C8B-B14F-4D97-AF65-F5344CB8AC3E}">
-        <p14:creationId xmlns:p14="http://schemas.microsoft.com/office/powerpoint/2010/main" val="332430948"/>
+        <p14:creationId xmlns:p14="http://schemas.microsoft.com/office/powerpoint/2010/main" val="1510321094"/>
       </p:ext>
     </p:extLst>
   </p:cSld>
@@ -1310,7 +1552,57 @@
           <a:bodyPr/>
           <a:lstStyle/>
           <a:p>
-            <a:endParaRPr lang="en-US" dirty="0"/>
+            <a:pPr marL="0" marR="0" lvl="0" indent="0" algn="l" defTabSz="914400" rtl="0" eaLnBrk="1" fontAlgn="auto" latinLnBrk="0" hangingPunct="1">
+              <a:lnSpc>
+                <a:spcPct val="100000"/>
+              </a:lnSpc>
+              <a:spcBef>
+                <a:spcPts val="0"/>
+              </a:spcBef>
+              <a:spcAft>
+                <a:spcPts val="0"/>
+              </a:spcAft>
+              <a:buClrTx/>
+              <a:buSzTx/>
+              <a:buFontTx/>
+              <a:buNone/>
+              <a:tabLst/>
+              <a:defRPr/>
+            </a:pPr>
+            <a:r>
+              <a:rPr lang="en-US" dirty="0"/>
+              <a:t>Answer: c</a:t>
+            </a:r>
+            <a:endParaRPr lang="en-US" u="sng" dirty="0">
+              <a:solidFill>
+                <a:schemeClr val="hlink"/>
+              </a:solidFill>
+              <a:hlinkClick r:id="rId3"/>
+            </a:endParaRPr>
+          </a:p>
+          <a:p>
+            <a:pPr marL="0" marR="0" lvl="0" indent="0" algn="l" defTabSz="914400" rtl="0" eaLnBrk="1" fontAlgn="auto" latinLnBrk="0" hangingPunct="1">
+              <a:lnSpc>
+                <a:spcPct val="100000"/>
+              </a:lnSpc>
+              <a:spcBef>
+                <a:spcPts val="0"/>
+              </a:spcBef>
+              <a:spcAft>
+                <a:spcPts val="0"/>
+              </a:spcAft>
+              <a:buClrTx/>
+              <a:buSzTx/>
+              <a:buFontTx/>
+              <a:buNone/>
+              <a:tabLst/>
+              <a:defRPr/>
+            </a:pPr>
+            <a:endParaRPr lang="en-US" u="none" dirty="0">
+              <a:solidFill>
+                <a:schemeClr val="hlink"/>
+              </a:solidFill>
+            </a:endParaRPr>
           </a:p>
         </p:txBody>
       </p:sp>
@@ -1332,6 +1624,90 @@
             <a:fld id="{01283FAC-A721-45A3-BBDE-EAF2B09B7CD9}" type="slidenum">
               <a:rPr lang="en-US" smtClean="0"/>
               <a:t>15</a:t>
+            </a:fld>
+            <a:endParaRPr lang="en-US"/>
+          </a:p>
+        </p:txBody>
+      </p:sp>
+    </p:spTree>
+    <p:extLst>
+      <p:ext uri="{BB962C8B-B14F-4D97-AF65-F5344CB8AC3E}">
+        <p14:creationId xmlns:p14="http://schemas.microsoft.com/office/powerpoint/2010/main" val="332430948"/>
+      </p:ext>
+    </p:extLst>
+  </p:cSld>
+  <p:clrMapOvr>
+    <a:masterClrMapping/>
+  </p:clrMapOvr>
+</p:notes>
+</file>
+
+<file path=ppt/notesSlides/notesSlide16.xml><?xml version="1.0" encoding="utf-8"?>
+<p:notes xmlns:a="http://schemas.openxmlformats.org/drawingml/2006/main" xmlns:r="http://schemas.openxmlformats.org/officeDocument/2006/relationships" xmlns:p="http://schemas.openxmlformats.org/presentationml/2006/main">
+  <p:cSld>
+    <p:spTree>
+      <p:nvGrpSpPr>
+        <p:cNvPr id="1" name=""/>
+        <p:cNvGrpSpPr/>
+        <p:nvPr/>
+      </p:nvGrpSpPr>
+      <p:grpSpPr>
+        <a:xfrm>
+          <a:off x="0" y="0"/>
+          <a:ext cx="0" cy="0"/>
+          <a:chOff x="0" y="0"/>
+          <a:chExt cx="0" cy="0"/>
+        </a:xfrm>
+      </p:grpSpPr>
+      <p:sp>
+        <p:nvSpPr>
+          <p:cNvPr id="2" name="Slide Image Placeholder 1"/>
+          <p:cNvSpPr>
+            <a:spLocks noGrp="1" noRot="1" noChangeAspect="1"/>
+          </p:cNvSpPr>
+          <p:nvPr>
+            <p:ph type="sldImg"/>
+          </p:nvPr>
+        </p:nvSpPr>
+        <p:spPr/>
+      </p:sp>
+      <p:sp>
+        <p:nvSpPr>
+          <p:cNvPr id="3" name="Notes Placeholder 2"/>
+          <p:cNvSpPr>
+            <a:spLocks noGrp="1"/>
+          </p:cNvSpPr>
+          <p:nvPr>
+            <p:ph type="body" idx="1"/>
+          </p:nvPr>
+        </p:nvSpPr>
+        <p:spPr/>
+        <p:txBody>
+          <a:bodyPr/>
+          <a:lstStyle/>
+          <a:p>
+            <a:endParaRPr lang="en-US" dirty="0"/>
+          </a:p>
+        </p:txBody>
+      </p:sp>
+      <p:sp>
+        <p:nvSpPr>
+          <p:cNvPr id="4" name="Slide Number Placeholder 3"/>
+          <p:cNvSpPr>
+            <a:spLocks noGrp="1"/>
+          </p:cNvSpPr>
+          <p:nvPr>
+            <p:ph type="sldNum" sz="quarter" idx="10"/>
+          </p:nvPr>
+        </p:nvSpPr>
+        <p:spPr/>
+        <p:txBody>
+          <a:bodyPr/>
+          <a:lstStyle/>
+          <a:p>
+            <a:fld id="{01283FAC-A721-45A3-BBDE-EAF2B09B7CD9}" type="slidenum">
+              <a:rPr lang="en-US" smtClean="0"/>
+              <a:t>16</a:t>
             </a:fld>
             <a:endParaRPr lang="en-US"/>
           </a:p>
@@ -1415,6 +1791,7 @@
           <a:p>
             <a:fld id="{01283FAC-A721-45A3-BBDE-EAF2B09B7CD9}" type="slidenum">
               <a:rPr lang="en-US" smtClean="0"/>
+              <a:pPr/>
               <a:t>2</a:t>
             </a:fld>
             <a:endParaRPr lang="en-US"/>
@@ -1424,7 +1801,7 @@
     </p:spTree>
     <p:extLst>
       <p:ext uri="{BB962C8B-B14F-4D97-AF65-F5344CB8AC3E}">
-        <p14:creationId xmlns:p14="http://schemas.microsoft.com/office/powerpoint/2010/main" val="2018903472"/>
+        <p14:creationId xmlns:p14="http://schemas.microsoft.com/office/powerpoint/2010/main" val="2924384280"/>
       </p:ext>
     </p:extLst>
   </p:cSld>
@@ -1499,7 +1876,6 @@
           <a:p>
             <a:fld id="{01283FAC-A721-45A3-BBDE-EAF2B09B7CD9}" type="slidenum">
               <a:rPr lang="en-US" smtClean="0"/>
-              <a:pPr/>
               <a:t>3</a:t>
             </a:fld>
             <a:endParaRPr lang="en-US"/>
@@ -1509,7 +1885,7 @@
     </p:spTree>
     <p:extLst>
       <p:ext uri="{BB962C8B-B14F-4D97-AF65-F5344CB8AC3E}">
-        <p14:creationId xmlns:p14="http://schemas.microsoft.com/office/powerpoint/2010/main" val="329914208"/>
+        <p14:creationId xmlns:p14="http://schemas.microsoft.com/office/powerpoint/2010/main" val="2018903472"/>
       </p:ext>
     </p:extLst>
   </p:cSld>
@@ -1563,46 +1939,6 @@
           <a:bodyPr/>
           <a:lstStyle/>
           <a:p>
-            <a:pPr marL="0" marR="0" lvl="0" indent="0" algn="l" defTabSz="914400" rtl="0" eaLnBrk="1" fontAlgn="auto" latinLnBrk="0" hangingPunct="1">
-              <a:lnSpc>
-                <a:spcPct val="100000"/>
-              </a:lnSpc>
-              <a:spcBef>
-                <a:spcPts val="0"/>
-              </a:spcBef>
-              <a:spcAft>
-                <a:spcPts val="0"/>
-              </a:spcAft>
-              <a:buClrTx/>
-              <a:buSzTx/>
-              <a:buFontTx/>
-              <a:buNone/>
-              <a:tabLst/>
-              <a:defRPr/>
-            </a:pPr>
-            <a:r>
-              <a:rPr lang="en-US" b="1" dirty="0" smtClean="0"/>
-              <a:t>Notes</a:t>
-            </a:r>
-          </a:p>
-          <a:p>
-            <a:pPr marL="0" marR="0" lvl="0" indent="0" algn="l" defTabSz="914400" rtl="0" eaLnBrk="1" fontAlgn="auto" latinLnBrk="0" hangingPunct="1">
-              <a:lnSpc>
-                <a:spcPct val="100000"/>
-              </a:lnSpc>
-              <a:spcBef>
-                <a:spcPts val="0"/>
-              </a:spcBef>
-              <a:spcAft>
-                <a:spcPts val="0"/>
-              </a:spcAft>
-              <a:buClrTx/>
-              <a:buSzTx/>
-              <a:buFontTx/>
-              <a:buNone/>
-              <a:tabLst/>
-              <a:defRPr/>
-            </a:pPr>
             <a:endParaRPr lang="en-US" dirty="0"/>
           </a:p>
         </p:txBody>
@@ -1624,6 +1960,7 @@
           <a:p>
             <a:fld id="{01283FAC-A721-45A3-BBDE-EAF2B09B7CD9}" type="slidenum">
               <a:rPr lang="en-US" smtClean="0"/>
+              <a:pPr/>
               <a:t>4</a:t>
             </a:fld>
             <a:endParaRPr lang="en-US"/>
@@ -1633,7 +1970,7 @@
     </p:spTree>
     <p:extLst>
       <p:ext uri="{BB962C8B-B14F-4D97-AF65-F5344CB8AC3E}">
-        <p14:creationId xmlns:p14="http://schemas.microsoft.com/office/powerpoint/2010/main" val="1429399873"/>
+        <p14:creationId xmlns:p14="http://schemas.microsoft.com/office/powerpoint/2010/main" val="329914208"/>
       </p:ext>
     </p:extLst>
   </p:cSld>
@@ -1687,11 +2024,126 @@
           <a:bodyPr/>
           <a:lstStyle/>
           <a:p>
+            <a:pPr marL="0" marR="0" lvl="0" indent="0" algn="l" defTabSz="914400" rtl="0" eaLnBrk="1" fontAlgn="auto" latinLnBrk="0" hangingPunct="1">
+              <a:lnSpc>
+                <a:spcPct val="100000"/>
+              </a:lnSpc>
+              <a:spcBef>
+                <a:spcPts val="0"/>
+              </a:spcBef>
+              <a:spcAft>
+                <a:spcPts val="0"/>
+              </a:spcAft>
+              <a:buClrTx/>
+              <a:buSzTx/>
+              <a:buFontTx/>
+              <a:buNone/>
+              <a:tabLst/>
+              <a:defRPr/>
+            </a:pPr>
             <a:r>
               <a:rPr lang="en-US" b="1" dirty="0" smtClean="0"/>
-              <a:t>Notes</a:t>
-            </a:r>
-            <a:endParaRPr lang="en-US" b="1" dirty="0"/>
+              <a:t>Notes:</a:t>
+            </a:r>
+          </a:p>
+          <a:p>
+            <a:pPr marL="228600" marR="0" lvl="0" indent="-228600" algn="l" defTabSz="914400" rtl="0" eaLnBrk="1" fontAlgn="auto" latinLnBrk="0" hangingPunct="1">
+              <a:lnSpc>
+                <a:spcPct val="100000"/>
+              </a:lnSpc>
+              <a:spcBef>
+                <a:spcPts val="0"/>
+              </a:spcBef>
+              <a:spcAft>
+                <a:spcPts val="0"/>
+              </a:spcAft>
+              <a:buClrTx/>
+              <a:buSzTx/>
+              <a:buFont typeface="Arial"/>
+              <a:buChar char="•"/>
+              <a:tabLst/>
+              <a:defRPr/>
+            </a:pPr>
+            <a:r>
+              <a:rPr lang="en-US" dirty="0" smtClean="0"/>
+              <a:t>There is no one definition of “</a:t>
+            </a:r>
+            <a:r>
+              <a:rPr lang="en-US" dirty="0" err="1" smtClean="0"/>
+              <a:t>DevOps</a:t>
+            </a:r>
+            <a:r>
+              <a:rPr lang="en-US" dirty="0" smtClean="0"/>
+              <a:t>”.  There</a:t>
+            </a:r>
+            <a:r>
+              <a:rPr lang="en-US" baseline="0" dirty="0" smtClean="0"/>
+              <a:t> are many opinions on the topic.</a:t>
+            </a:r>
+          </a:p>
+          <a:p>
+            <a:pPr marL="228600" marR="0" lvl="0" indent="-228600" algn="l" defTabSz="914400" rtl="0" eaLnBrk="1" fontAlgn="auto" latinLnBrk="0" hangingPunct="1">
+              <a:lnSpc>
+                <a:spcPct val="100000"/>
+              </a:lnSpc>
+              <a:spcBef>
+                <a:spcPts val="0"/>
+              </a:spcBef>
+              <a:spcAft>
+                <a:spcPts val="0"/>
+              </a:spcAft>
+              <a:buClrTx/>
+              <a:buSzTx/>
+              <a:buFont typeface="Arial"/>
+              <a:buChar char="•"/>
+              <a:tabLst/>
+              <a:defRPr/>
+            </a:pPr>
+            <a:r>
+              <a:rPr lang="en-US" baseline="0" dirty="0" smtClean="0"/>
+              <a:t>In Chef courses, we’ve observed about 80% of the students are from an Operations background.</a:t>
+            </a:r>
+            <a:endParaRPr lang="en-US" dirty="0" smtClean="0"/>
+          </a:p>
+          <a:p>
+            <a:pPr marL="0" marR="0" lvl="0" indent="0" algn="l" defTabSz="914400" rtl="0" eaLnBrk="1" fontAlgn="auto" latinLnBrk="0" hangingPunct="1">
+              <a:lnSpc>
+                <a:spcPct val="100000"/>
+              </a:lnSpc>
+              <a:spcBef>
+                <a:spcPts val="0"/>
+              </a:spcBef>
+              <a:spcAft>
+                <a:spcPts val="0"/>
+              </a:spcAft>
+              <a:buClrTx/>
+              <a:buSzTx/>
+              <a:buFontTx/>
+              <a:buNone/>
+              <a:tabLst/>
+              <a:defRPr/>
+            </a:pPr>
+            <a:endParaRPr lang="en-US" b="1" dirty="0" smtClean="0"/>
+          </a:p>
+          <a:p>
+            <a:pPr marL="0" marR="0" lvl="0" indent="0" algn="l" defTabSz="914400" rtl="0" eaLnBrk="1" fontAlgn="auto" latinLnBrk="0" hangingPunct="1">
+              <a:lnSpc>
+                <a:spcPct val="100000"/>
+              </a:lnSpc>
+              <a:spcBef>
+                <a:spcPts val="0"/>
+              </a:spcBef>
+              <a:spcAft>
+                <a:spcPts val="0"/>
+              </a:spcAft>
+              <a:buClrTx/>
+              <a:buSzTx/>
+              <a:buFontTx/>
+              <a:buNone/>
+              <a:tabLst/>
+              <a:defRPr/>
+            </a:pPr>
+            <a:endParaRPr lang="en-US" dirty="0"/>
           </a:p>
         </p:txBody>
       </p:sp>
@@ -1712,7 +2164,6 @@
           <a:p>
             <a:fld id="{01283FAC-A721-45A3-BBDE-EAF2B09B7CD9}" type="slidenum">
               <a:rPr lang="en-US" smtClean="0"/>
-              <a:pPr/>
               <a:t>5</a:t>
             </a:fld>
             <a:endParaRPr lang="en-US"/>
@@ -1722,7 +2173,7 @@
     </p:spTree>
     <p:extLst>
       <p:ext uri="{BB962C8B-B14F-4D97-AF65-F5344CB8AC3E}">
-        <p14:creationId xmlns:p14="http://schemas.microsoft.com/office/powerpoint/2010/main" val="3120445206"/>
+        <p14:creationId xmlns:p14="http://schemas.microsoft.com/office/powerpoint/2010/main" val="1429399873"/>
       </p:ext>
     </p:extLst>
   </p:cSld>
@@ -1776,7 +2227,13 @@
           <a:bodyPr/>
           <a:lstStyle/>
           <a:p>
-            <a:pPr marL="0" marR="0" lvl="0" indent="0" algn="l" defTabSz="914400" rtl="0" eaLnBrk="1" fontAlgn="auto" latinLnBrk="0" hangingPunct="1">
+            <a:r>
+              <a:rPr lang="en-US" b="1" dirty="0" smtClean="0"/>
+              <a:t>Notes:</a:t>
+            </a:r>
+          </a:p>
+          <a:p>
+            <a:pPr marL="171450" marR="0" indent="-171450" algn="l" defTabSz="914400" rtl="0" eaLnBrk="1" fontAlgn="auto" latinLnBrk="0" hangingPunct="1">
               <a:lnSpc>
                 <a:spcPct val="100000"/>
               </a:lnSpc>
@@ -1788,35 +2245,27 @@
               </a:spcAft>
               <a:buClrTx/>
               <a:buSzTx/>
-              <a:buFontTx/>
-              <a:buNone/>
+              <a:buFont typeface="Arial"/>
+              <a:buChar char="•"/>
               <a:tabLst/>
               <a:defRPr/>
             </a:pPr>
             <a:r>
-              <a:rPr lang="en-US" b="1" smtClean="0"/>
-              <a:t>Notes</a:t>
-            </a:r>
-          </a:p>
-          <a:p>
-            <a:pPr marL="0" marR="0" lvl="0" indent="0" algn="l" defTabSz="914400" rtl="0" eaLnBrk="1" fontAlgn="auto" latinLnBrk="0" hangingPunct="1">
-              <a:lnSpc>
-                <a:spcPct val="100000"/>
-              </a:lnSpc>
-              <a:spcBef>
-                <a:spcPts val="0"/>
-              </a:spcBef>
-              <a:spcAft>
-                <a:spcPts val="0"/>
-              </a:spcAft>
-              <a:buClrTx/>
-              <a:buSzTx/>
-              <a:buFontTx/>
-              <a:buNone/>
-              <a:tabLst/>
-              <a:defRPr/>
-            </a:pPr>
-            <a:endParaRPr lang="en-US" dirty="0"/>
+              <a:rPr lang="en-US" b="0" dirty="0" smtClean="0"/>
+              <a:t>Yet</a:t>
+            </a:r>
+            <a:r>
+              <a:rPr lang="en-US" b="0" baseline="0" dirty="0" smtClean="0"/>
+              <a:t> another opinion on the definition and purpose of </a:t>
+            </a:r>
+            <a:r>
+              <a:rPr lang="en-US" b="0" baseline="0" dirty="0" err="1" smtClean="0"/>
+              <a:t>DevOps</a:t>
+            </a:r>
+            <a:endParaRPr lang="en-US" b="0" dirty="0" smtClean="0"/>
+          </a:p>
+          <a:p>
+            <a:endParaRPr lang="en-US" b="1" dirty="0"/>
           </a:p>
         </p:txBody>
       </p:sp>
@@ -1837,6 +2286,7 @@
           <a:p>
             <a:fld id="{01283FAC-A721-45A3-BBDE-EAF2B09B7CD9}" type="slidenum">
               <a:rPr lang="en-US" smtClean="0"/>
+              <a:pPr/>
               <a:t>6</a:t>
             </a:fld>
             <a:endParaRPr lang="en-US"/>
@@ -1846,7 +2296,7 @@
     </p:spTree>
     <p:extLst>
       <p:ext uri="{BB962C8B-B14F-4D97-AF65-F5344CB8AC3E}">
-        <p14:creationId xmlns:p14="http://schemas.microsoft.com/office/powerpoint/2010/main" val="634824526"/>
+        <p14:creationId xmlns:p14="http://schemas.microsoft.com/office/powerpoint/2010/main" val="3120445206"/>
       </p:ext>
     </p:extLst>
   </p:cSld>
@@ -1918,14 +2368,65 @@
               <a:defRPr/>
             </a:pPr>
             <a:r>
-              <a:rPr lang="en-US" b="1" dirty="0"/>
-              <a:t>Notes</a:t>
-            </a:r>
-            <a:r>
               <a:rPr lang="en-US" b="1" dirty="0" smtClean="0"/>
-              <a:t>:</a:t>
-            </a:r>
-            <a:endParaRPr lang="en-US" b="1" dirty="0"/>
+              <a:t>Notes;</a:t>
+            </a:r>
+          </a:p>
+          <a:p>
+            <a:pPr marL="171450" marR="0" lvl="0" indent="-171450" algn="l" defTabSz="914400" rtl="0" eaLnBrk="1" fontAlgn="auto" latinLnBrk="0" hangingPunct="1">
+              <a:lnSpc>
+                <a:spcPct val="100000"/>
+              </a:lnSpc>
+              <a:spcBef>
+                <a:spcPts val="0"/>
+              </a:spcBef>
+              <a:spcAft>
+                <a:spcPts val="0"/>
+              </a:spcAft>
+              <a:buClrTx/>
+              <a:buSzTx/>
+              <a:buFont typeface="Arial"/>
+              <a:buChar char="•"/>
+              <a:tabLst/>
+              <a:defRPr/>
+            </a:pPr>
+            <a:r>
+              <a:rPr lang="en-US" dirty="0" smtClean="0"/>
+              <a:t>And another opinion about </a:t>
+            </a:r>
+            <a:r>
+              <a:rPr lang="en-US" dirty="0" err="1" smtClean="0"/>
+              <a:t>DevOps</a:t>
+            </a:r>
+            <a:r>
+              <a:rPr lang="en-US" dirty="0" smtClean="0"/>
+              <a:t>.  This</a:t>
+            </a:r>
+            <a:r>
+              <a:rPr lang="en-US" baseline="0" dirty="0" smtClean="0"/>
+              <a:t> definition is very open and inclusive</a:t>
+            </a:r>
+            <a:endParaRPr lang="en-US" b="1" dirty="0" smtClean="0"/>
+          </a:p>
+          <a:p>
+            <a:pPr marL="0" marR="0" lvl="0" indent="0" algn="l" defTabSz="914400" rtl="0" eaLnBrk="1" fontAlgn="auto" latinLnBrk="0" hangingPunct="1">
+              <a:lnSpc>
+                <a:spcPct val="100000"/>
+              </a:lnSpc>
+              <a:spcBef>
+                <a:spcPts val="0"/>
+              </a:spcBef>
+              <a:spcAft>
+                <a:spcPts val="0"/>
+              </a:spcAft>
+              <a:buClrTx/>
+              <a:buSzTx/>
+              <a:buFontTx/>
+              <a:buNone/>
+              <a:tabLst/>
+              <a:defRPr/>
+            </a:pPr>
+            <a:endParaRPr lang="en-US" dirty="0"/>
           </a:p>
         </p:txBody>
       </p:sp>
@@ -1955,7 +2456,7 @@
     </p:spTree>
     <p:extLst>
       <p:ext uri="{BB962C8B-B14F-4D97-AF65-F5344CB8AC3E}">
-        <p14:creationId xmlns:p14="http://schemas.microsoft.com/office/powerpoint/2010/main" val="1510321094"/>
+        <p14:creationId xmlns:p14="http://schemas.microsoft.com/office/powerpoint/2010/main" val="634824526"/>
       </p:ext>
     </p:extLst>
   </p:cSld>
@@ -2026,15 +2527,7 @@
               <a:tabLst/>
               <a:defRPr/>
             </a:pPr>
-            <a:r>
-              <a:rPr lang="en-US" b="1" dirty="0"/>
-              <a:t>Notes</a:t>
-            </a:r>
-            <a:r>
-              <a:rPr lang="en-US" b="1" dirty="0" smtClean="0"/>
-              <a:t>:</a:t>
-            </a:r>
-            <a:endParaRPr lang="en-US" b="1" dirty="0"/>
+            <a:endParaRPr lang="en-US" b="0" baseline="0" dirty="0" smtClean="0"/>
           </a:p>
         </p:txBody>
       </p:sp>
@@ -2135,14 +2628,6 @@
               <a:tabLst/>
               <a:defRPr/>
             </a:pPr>
-            <a:r>
-              <a:rPr lang="en-US" b="1" dirty="0"/>
-              <a:t>Notes</a:t>
-            </a:r>
-            <a:r>
-              <a:rPr lang="en-US" b="1" dirty="0" smtClean="0"/>
-              <a:t>:</a:t>
-            </a:r>
             <a:endParaRPr lang="en-US" b="1" dirty="0"/>
           </a:p>
         </p:txBody>
@@ -2331,7 +2816,7 @@
             <a:fld id="{0459C166-16D3-4A25-A2F8-C51E0E346B22}" type="datetimeFigureOut">
               <a:rPr lang="en-US" smtClean="0"/>
               <a:pPr/>
-              <a:t>5/20/16</a:t>
+              <a:t>6/29/16</a:t>
             </a:fld>
             <a:endParaRPr lang="en-US"/>
           </a:p>
@@ -2501,7 +2986,7 @@
             <a:fld id="{0459C166-16D3-4A25-A2F8-C51E0E346B22}" type="datetimeFigureOut">
               <a:rPr lang="en-US" smtClean="0"/>
               <a:pPr/>
-              <a:t>5/20/16</a:t>
+              <a:t>6/29/16</a:t>
             </a:fld>
             <a:endParaRPr lang="en-US"/>
           </a:p>
@@ -2681,7 +3166,7 @@
             <a:fld id="{0459C166-16D3-4A25-A2F8-C51E0E346B22}" type="datetimeFigureOut">
               <a:rPr lang="en-US" smtClean="0"/>
               <a:pPr/>
-              <a:t>5/20/16</a:t>
+              <a:t>6/29/16</a:t>
             </a:fld>
             <a:endParaRPr lang="en-US"/>
           </a:p>
@@ -2898,7 +3383,7 @@
                 <a:latin typeface="Segoe UI"/>
               </a:rPr>
               <a:pPr/>
-              <a:t>5/20/16</a:t>
+              <a:t>6/29/16</a:t>
             </a:fld>
             <a:endParaRPr lang="en-US">
               <a:solidFill>
@@ -3103,7 +3588,7 @@
                 <a:latin typeface="Segoe UI"/>
               </a:rPr>
               <a:pPr/>
-              <a:t>5/20/16</a:t>
+              <a:t>6/29/16</a:t>
             </a:fld>
             <a:endParaRPr lang="en-US">
               <a:solidFill>
@@ -3401,7 +3886,7 @@
                 <a:latin typeface="Segoe UI"/>
               </a:rPr>
               <a:pPr/>
-              <a:t>5/20/16</a:t>
+              <a:t>6/29/16</a:t>
             </a:fld>
             <a:endParaRPr lang="en-US">
               <a:solidFill>
@@ -3745,7 +4230,7 @@
                 <a:latin typeface="Segoe UI"/>
               </a:rPr>
               <a:pPr/>
-              <a:t>5/20/16</a:t>
+              <a:t>6/29/16</a:t>
             </a:fld>
             <a:endParaRPr lang="en-US">
               <a:solidFill>
@@ -4120,7 +4605,7 @@
                 <a:latin typeface="Segoe UI"/>
               </a:rPr>
               <a:pPr/>
-              <a:t>5/20/16</a:t>
+              <a:t>6/29/16</a:t>
             </a:fld>
             <a:endParaRPr lang="en-US">
               <a:solidFill>
@@ -4996,7 +5481,7 @@
             <a:fld id="{0459C166-16D3-4A25-A2F8-C51E0E346B22}" type="datetimeFigureOut">
               <a:rPr lang="en-US" smtClean="0"/>
               <a:pPr/>
-              <a:t>5/20/16</a:t>
+              <a:t>6/29/16</a:t>
             </a:fld>
             <a:endParaRPr lang="en-US"/>
           </a:p>
@@ -5234,7 +5719,7 @@
                 <a:latin typeface="Segoe UI"/>
               </a:rPr>
               <a:pPr/>
-              <a:t>5/20/16</a:t>
+              <a:t>6/29/16</a:t>
             </a:fld>
             <a:endParaRPr lang="en-US">
               <a:solidFill>
@@ -5635,7 +6120,7 @@
                 <a:latin typeface="Segoe UI"/>
               </a:rPr>
               <a:pPr/>
-              <a:t>5/20/16</a:t>
+              <a:t>6/29/16</a:t>
             </a:fld>
             <a:endParaRPr lang="en-US">
               <a:solidFill>
@@ -5789,7 +6274,7 @@
                 <a:latin typeface="Segoe UI"/>
               </a:rPr>
               <a:pPr/>
-              <a:t>5/20/16</a:t>
+              <a:t>6/29/16</a:t>
             </a:fld>
             <a:endParaRPr lang="en-US">
               <a:solidFill>
@@ -5921,7 +6406,7 @@
                 <a:latin typeface="Segoe UI"/>
               </a:rPr>
               <a:pPr/>
-              <a:t>5/20/16</a:t>
+              <a:t>6/29/16</a:t>
             </a:fld>
             <a:endParaRPr lang="en-US">
               <a:solidFill>
@@ -6233,7 +6718,7 @@
                 <a:latin typeface="Segoe UI"/>
               </a:rPr>
               <a:pPr/>
-              <a:t>5/20/16</a:t>
+              <a:t>6/29/16</a:t>
             </a:fld>
             <a:endParaRPr lang="en-US">
               <a:solidFill>
@@ -6522,7 +7007,7 @@
                 <a:latin typeface="Segoe UI"/>
               </a:rPr>
               <a:pPr/>
-              <a:t>5/20/16</a:t>
+              <a:t>6/29/16</a:t>
             </a:fld>
             <a:endParaRPr lang="en-US">
               <a:solidFill>
@@ -6727,7 +7212,7 @@
                 <a:latin typeface="Segoe UI"/>
               </a:rPr>
               <a:pPr/>
-              <a:t>5/20/16</a:t>
+              <a:t>6/29/16</a:t>
             </a:fld>
             <a:endParaRPr lang="en-US">
               <a:solidFill>
@@ -6942,7 +7427,7 @@
                 <a:latin typeface="Segoe UI"/>
               </a:rPr>
               <a:pPr/>
-              <a:t>5/20/16</a:t>
+              <a:t>6/29/16</a:t>
             </a:fld>
             <a:endParaRPr lang="en-US">
               <a:solidFill>
@@ -7237,7 +7722,7 @@
             <a:fld id="{0459C166-16D3-4A25-A2F8-C51E0E346B22}" type="datetimeFigureOut">
               <a:rPr lang="en-US" smtClean="0"/>
               <a:pPr/>
-              <a:t>5/20/16</a:t>
+              <a:t>6/29/16</a:t>
             </a:fld>
             <a:endParaRPr lang="en-US"/>
           </a:p>
@@ -7484,7 +7969,7 @@
             <a:fld id="{0459C166-16D3-4A25-A2F8-C51E0E346B22}" type="datetimeFigureOut">
               <a:rPr lang="en-US" smtClean="0"/>
               <a:pPr/>
-              <a:t>5/20/16</a:t>
+              <a:t>6/29/16</a:t>
             </a:fld>
             <a:endParaRPr lang="en-US"/>
           </a:p>
@@ -7850,7 +8335,7 @@
             <a:fld id="{0459C166-16D3-4A25-A2F8-C51E0E346B22}" type="datetimeFigureOut">
               <a:rPr lang="en-US" smtClean="0"/>
               <a:pPr/>
-              <a:t>5/20/16</a:t>
+              <a:t>6/29/16</a:t>
             </a:fld>
             <a:endParaRPr lang="en-US"/>
           </a:p>
@@ -7969,7 +8454,7 @@
             <a:fld id="{0459C166-16D3-4A25-A2F8-C51E0E346B22}" type="datetimeFigureOut">
               <a:rPr lang="en-US" smtClean="0"/>
               <a:pPr/>
-              <a:t>5/20/16</a:t>
+              <a:t>6/29/16</a:t>
             </a:fld>
             <a:endParaRPr lang="en-US"/>
           </a:p>
@@ -8066,7 +8551,7 @@
             <a:fld id="{0459C166-16D3-4A25-A2F8-C51E0E346B22}" type="datetimeFigureOut">
               <a:rPr lang="en-US" smtClean="0"/>
               <a:pPr/>
-              <a:t>5/20/16</a:t>
+              <a:t>6/29/16</a:t>
             </a:fld>
             <a:endParaRPr lang="en-US"/>
           </a:p>
@@ -8343,7 +8828,7 @@
             <a:fld id="{0459C166-16D3-4A25-A2F8-C51E0E346B22}" type="datetimeFigureOut">
               <a:rPr lang="en-US" smtClean="0"/>
               <a:pPr/>
-              <a:t>5/20/16</a:t>
+              <a:t>6/29/16</a:t>
             </a:fld>
             <a:endParaRPr lang="en-US"/>
           </a:p>
@@ -8597,7 +9082,7 @@
             <a:fld id="{0459C166-16D3-4A25-A2F8-C51E0E346B22}" type="datetimeFigureOut">
               <a:rPr lang="en-US" smtClean="0"/>
               <a:pPr/>
-              <a:t>5/20/16</a:t>
+              <a:t>6/29/16</a:t>
             </a:fld>
             <a:endParaRPr lang="en-US"/>
           </a:p>
@@ -8810,7 +9295,7 @@
             <a:fld id="{0459C166-16D3-4A25-A2F8-C51E0E346B22}" type="datetimeFigureOut">
               <a:rPr lang="en-US" smtClean="0"/>
               <a:pPr/>
-              <a:t>5/20/16</a:t>
+              <a:t>6/29/16</a:t>
             </a:fld>
             <a:endParaRPr lang="en-US"/>
           </a:p>
@@ -9357,7 +9842,7 @@
                 <a:latin typeface="Segoe UI"/>
               </a:rPr>
               <a:pPr/>
-              <a:t>5/20/16</a:t>
+              <a:t>6/29/16</a:t>
             </a:fld>
             <a:endParaRPr lang="en-US">
               <a:solidFill>
@@ -9956,6 +10441,418 @@
         </p:spPr>
         <p:txBody>
           <a:bodyPr>
+            <a:normAutofit/>
+          </a:bodyPr>
+          <a:lstStyle/>
+          <a:p>
+            <a:r>
+              <a:rPr lang="en-US" sz="4800" dirty="0" smtClean="0"/>
+              <a:t>What Led To The Creation of DevOps</a:t>
+            </a:r>
+            <a:endParaRPr lang="en-US" sz="4800" dirty="0"/>
+          </a:p>
+        </p:txBody>
+      </p:sp>
+      <p:grpSp>
+        <p:nvGrpSpPr>
+          <p:cNvPr id="30" name="Group 29"/>
+          <p:cNvGrpSpPr/>
+          <p:nvPr/>
+        </p:nvGrpSpPr>
+        <p:grpSpPr>
+          <a:xfrm>
+            <a:off x="1" y="1947672"/>
+            <a:ext cx="12191999" cy="791753"/>
+            <a:chOff x="979715" y="1950630"/>
+            <a:chExt cx="9998962" cy="832911"/>
+          </a:xfrm>
+        </p:grpSpPr>
+        <p:sp>
+          <p:nvSpPr>
+            <p:cNvPr id="33" name="Rectangle 32"/>
+            <p:cNvSpPr/>
+            <p:nvPr/>
+          </p:nvSpPr>
+          <p:spPr>
+            <a:xfrm>
+              <a:off x="979715" y="1950630"/>
+              <a:ext cx="9998962" cy="832911"/>
+            </a:xfrm>
+            <a:prstGeom prst="rect">
+              <a:avLst/>
+            </a:prstGeom>
+            <a:solidFill>
+              <a:srgbClr val="0070C0"/>
+            </a:solidFill>
+            <a:ln w="9525" cap="flat" cmpd="sng" algn="ctr">
+              <a:noFill/>
+              <a:prstDash val="solid"/>
+            </a:ln>
+            <a:effectLst/>
+          </p:spPr>
+          <p:txBody>
+            <a:bodyPr rtlCol="0" anchor="ctr"/>
+            <a:lstStyle/>
+            <a:p>
+              <a:pPr marL="0" marR="0" lvl="0" indent="0" algn="ctr" defTabSz="914400" eaLnBrk="1" fontAlgn="auto" latinLnBrk="0" hangingPunct="1">
+                <a:lnSpc>
+                  <a:spcPct val="100000"/>
+                </a:lnSpc>
+                <a:spcBef>
+                  <a:spcPts val="0"/>
+                </a:spcBef>
+                <a:spcAft>
+                  <a:spcPts val="0"/>
+                </a:spcAft>
+                <a:buClrTx/>
+                <a:buSzTx/>
+                <a:buFont typeface="Arial" panose="020B0604020202020204" pitchFamily="34" charset="0"/>
+                <a:buNone/>
+                <a:tabLst/>
+                <a:defRPr/>
+              </a:pPr>
+              <a:endParaRPr kumimoji="0" lang="en-US" sz="4000" i="1" u="none" strike="noStrike" kern="0" cap="none" spc="0" normalizeH="0" baseline="0" noProof="0" dirty="0">
+                <a:ln>
+                  <a:noFill/>
+                </a:ln>
+                <a:solidFill>
+                  <a:prstClr val="white"/>
+                </a:solidFill>
+                <a:effectLst/>
+                <a:uLnTx/>
+                <a:uFillTx/>
+                <a:latin typeface="+mj-lt"/>
+              </a:endParaRPr>
+            </a:p>
+          </p:txBody>
+        </p:sp>
+        <p:sp>
+          <p:nvSpPr>
+            <p:cNvPr id="35" name="Content Placeholder 2"/>
+            <p:cNvSpPr txBox="1">
+              <a:spLocks/>
+            </p:cNvSpPr>
+            <p:nvPr/>
+          </p:nvSpPr>
+          <p:spPr>
+            <a:xfrm>
+              <a:off x="1555276" y="1950630"/>
+              <a:ext cx="9295782" cy="832911"/>
+            </a:xfrm>
+            <a:prstGeom prst="rect">
+              <a:avLst/>
+            </a:prstGeom>
+          </p:spPr>
+          <p:txBody>
+            <a:bodyPr anchor="ctr"/>
+            <a:lstStyle>
+              <a:lvl1pPr marL="0" indent="0" algn="ctr" defTabSz="914400" rtl="0" eaLnBrk="1" latinLnBrk="0" hangingPunct="1">
+                <a:lnSpc>
+                  <a:spcPct val="90000"/>
+                </a:lnSpc>
+                <a:spcBef>
+                  <a:spcPts val="1000"/>
+                </a:spcBef>
+                <a:buFont typeface="Arial" panose="020B0604020202020204" pitchFamily="34" charset="0"/>
+                <a:buNone/>
+                <a:defRPr sz="2800" i="1" kern="1200">
+                  <a:solidFill>
+                    <a:schemeClr val="bg1"/>
+                  </a:solidFill>
+                  <a:latin typeface="+mn-lt"/>
+                  <a:ea typeface="+mn-ea"/>
+                  <a:cs typeface="+mn-cs"/>
+                </a:defRPr>
+              </a:lvl1pPr>
+              <a:lvl2pPr marL="457200" indent="0" algn="ctr" defTabSz="914400" rtl="0" eaLnBrk="1" latinLnBrk="0" hangingPunct="1">
+                <a:lnSpc>
+                  <a:spcPct val="90000"/>
+                </a:lnSpc>
+                <a:spcBef>
+                  <a:spcPts val="500"/>
+                </a:spcBef>
+                <a:buFont typeface="Arial" panose="020B0604020202020204" pitchFamily="34" charset="0"/>
+                <a:buNone/>
+                <a:defRPr sz="2400" i="1" kern="1200">
+                  <a:solidFill>
+                    <a:schemeClr val="bg1"/>
+                  </a:solidFill>
+                  <a:latin typeface="+mn-lt"/>
+                  <a:ea typeface="+mn-ea"/>
+                  <a:cs typeface="+mn-cs"/>
+                </a:defRPr>
+              </a:lvl2pPr>
+              <a:lvl3pPr marL="914400" indent="0" algn="ctr" defTabSz="914400" rtl="0" eaLnBrk="1" latinLnBrk="0" hangingPunct="1">
+                <a:lnSpc>
+                  <a:spcPct val="90000"/>
+                </a:lnSpc>
+                <a:spcBef>
+                  <a:spcPts val="500"/>
+                </a:spcBef>
+                <a:buFont typeface="Arial" panose="020B0604020202020204" pitchFamily="34" charset="0"/>
+                <a:buNone/>
+                <a:defRPr sz="2000" i="1" kern="1200">
+                  <a:solidFill>
+                    <a:schemeClr val="bg1"/>
+                  </a:solidFill>
+                  <a:latin typeface="+mn-lt"/>
+                  <a:ea typeface="+mn-ea"/>
+                  <a:cs typeface="+mn-cs"/>
+                </a:defRPr>
+              </a:lvl3pPr>
+              <a:lvl4pPr marL="1371600" indent="0" algn="ctr" defTabSz="914400" rtl="0" eaLnBrk="1" latinLnBrk="0" hangingPunct="1">
+                <a:lnSpc>
+                  <a:spcPct val="90000"/>
+                </a:lnSpc>
+                <a:spcBef>
+                  <a:spcPts val="500"/>
+                </a:spcBef>
+                <a:buFont typeface="Arial" panose="020B0604020202020204" pitchFamily="34" charset="0"/>
+                <a:buNone/>
+                <a:defRPr sz="1800" i="1" kern="1200">
+                  <a:solidFill>
+                    <a:schemeClr val="bg1"/>
+                  </a:solidFill>
+                  <a:latin typeface="+mn-lt"/>
+                  <a:ea typeface="+mn-ea"/>
+                  <a:cs typeface="+mn-cs"/>
+                </a:defRPr>
+              </a:lvl4pPr>
+              <a:lvl5pPr marL="1828800" indent="0" algn="ctr" defTabSz="914400" rtl="0" eaLnBrk="1" latinLnBrk="0" hangingPunct="1">
+                <a:lnSpc>
+                  <a:spcPct val="90000"/>
+                </a:lnSpc>
+                <a:spcBef>
+                  <a:spcPts val="500"/>
+                </a:spcBef>
+                <a:buFont typeface="Arial" panose="020B0604020202020204" pitchFamily="34" charset="0"/>
+                <a:buNone/>
+                <a:defRPr sz="1800" i="1" kern="1200">
+                  <a:solidFill>
+                    <a:schemeClr val="bg1"/>
+                  </a:solidFill>
+                  <a:latin typeface="+mn-lt"/>
+                  <a:ea typeface="+mn-ea"/>
+                  <a:cs typeface="+mn-cs"/>
+                </a:defRPr>
+              </a:lvl5pPr>
+              <a:lvl6pPr marL="2514600" indent="-228600" algn="l" defTabSz="914400" rtl="0" eaLnBrk="1" latinLnBrk="0" hangingPunct="1">
+                <a:lnSpc>
+                  <a:spcPct val="90000"/>
+                </a:lnSpc>
+                <a:spcBef>
+                  <a:spcPts val="500"/>
+                </a:spcBef>
+                <a:buFont typeface="Arial" panose="020B0604020202020204" pitchFamily="34" charset="0"/>
+                <a:buChar char="•"/>
+                <a:defRPr sz="1800" kern="1200">
+                  <a:solidFill>
+                    <a:schemeClr val="tx1"/>
+                  </a:solidFill>
+                  <a:latin typeface="+mn-lt"/>
+                  <a:ea typeface="+mn-ea"/>
+                  <a:cs typeface="+mn-cs"/>
+                </a:defRPr>
+              </a:lvl6pPr>
+              <a:lvl7pPr marL="2971800" indent="-228600" algn="l" defTabSz="914400" rtl="0" eaLnBrk="1" latinLnBrk="0" hangingPunct="1">
+                <a:lnSpc>
+                  <a:spcPct val="90000"/>
+                </a:lnSpc>
+                <a:spcBef>
+                  <a:spcPts val="500"/>
+                </a:spcBef>
+                <a:buFont typeface="Arial" panose="020B0604020202020204" pitchFamily="34" charset="0"/>
+                <a:buChar char="•"/>
+                <a:defRPr sz="1800" kern="1200">
+                  <a:solidFill>
+                    <a:schemeClr val="tx1"/>
+                  </a:solidFill>
+                  <a:latin typeface="+mn-lt"/>
+                  <a:ea typeface="+mn-ea"/>
+                  <a:cs typeface="+mn-cs"/>
+                </a:defRPr>
+              </a:lvl7pPr>
+              <a:lvl8pPr marL="3429000" indent="-228600" algn="l" defTabSz="914400" rtl="0" eaLnBrk="1" latinLnBrk="0" hangingPunct="1">
+                <a:lnSpc>
+                  <a:spcPct val="90000"/>
+                </a:lnSpc>
+                <a:spcBef>
+                  <a:spcPts val="500"/>
+                </a:spcBef>
+                <a:buFont typeface="Arial" panose="020B0604020202020204" pitchFamily="34" charset="0"/>
+                <a:buChar char="•"/>
+                <a:defRPr sz="1800" kern="1200">
+                  <a:solidFill>
+                    <a:schemeClr val="tx1"/>
+                  </a:solidFill>
+                  <a:latin typeface="+mn-lt"/>
+                  <a:ea typeface="+mn-ea"/>
+                  <a:cs typeface="+mn-cs"/>
+                </a:defRPr>
+              </a:lvl8pPr>
+              <a:lvl9pPr marL="3886200" indent="-228600" algn="l" defTabSz="914400" rtl="0" eaLnBrk="1" latinLnBrk="0" hangingPunct="1">
+                <a:lnSpc>
+                  <a:spcPct val="90000"/>
+                </a:lnSpc>
+                <a:spcBef>
+                  <a:spcPts val="500"/>
+                </a:spcBef>
+                <a:buFont typeface="Arial" panose="020B0604020202020204" pitchFamily="34" charset="0"/>
+                <a:buChar char="•"/>
+                <a:defRPr sz="1800" kern="1200">
+                  <a:solidFill>
+                    <a:schemeClr val="tx1"/>
+                  </a:solidFill>
+                  <a:latin typeface="+mn-lt"/>
+                  <a:ea typeface="+mn-ea"/>
+                  <a:cs typeface="+mn-cs"/>
+                </a:defRPr>
+              </a:lvl9pPr>
+            </a:lstStyle>
+            <a:p>
+              <a:pPr algn="l"/>
+              <a:r>
+                <a:rPr lang="en-US" i="0" dirty="0" smtClean="0"/>
+                <a:t>There was an historical separation between the two groups	</a:t>
+              </a:r>
+              <a:endParaRPr lang="en-US" i="0" dirty="0"/>
+            </a:p>
+          </p:txBody>
+        </p:sp>
+      </p:grpSp>
+      <p:sp>
+        <p:nvSpPr>
+          <p:cNvPr id="54" name="Rectangle 53"/>
+          <p:cNvSpPr/>
+          <p:nvPr/>
+        </p:nvSpPr>
+        <p:spPr>
+          <a:xfrm>
+            <a:off x="0" y="2225737"/>
+            <a:ext cx="12192000" cy="3525279"/>
+          </a:xfrm>
+          <a:prstGeom prst="rect">
+            <a:avLst/>
+          </a:prstGeom>
+          <a:noFill/>
+          <a:ln>
+            <a:noFill/>
+          </a:ln>
+        </p:spPr>
+        <p:style>
+          <a:lnRef idx="2">
+            <a:schemeClr val="accent1">
+              <a:shade val="50000"/>
+            </a:schemeClr>
+          </a:lnRef>
+          <a:fillRef idx="1">
+            <a:schemeClr val="accent1"/>
+          </a:fillRef>
+          <a:effectRef idx="0">
+            <a:schemeClr val="accent1"/>
+          </a:effectRef>
+          <a:fontRef idx="minor">
+            <a:schemeClr val="lt1"/>
+          </a:fontRef>
+        </p:style>
+        <p:txBody>
+          <a:bodyPr rtlCol="0" anchor="ctr"/>
+          <a:lstStyle/>
+          <a:p>
+            <a:pPr marL="1146175" lvl="1" indent="-458788">
+              <a:buFont typeface="Wingdings" charset="2"/>
+              <a:buChar char="§"/>
+            </a:pPr>
+            <a:r>
+              <a:rPr lang="en-US" sz="2800" dirty="0" smtClean="0">
+                <a:solidFill>
+                  <a:srgbClr val="000000"/>
+                </a:solidFill>
+              </a:rPr>
+              <a:t>These groups did not traditionally work well together, with each group often seeing the other as an adversary, rather then an ally</a:t>
+            </a:r>
+            <a:endParaRPr lang="en-US" sz="2800" dirty="0">
+              <a:solidFill>
+                <a:srgbClr val="000000"/>
+              </a:solidFill>
+            </a:endParaRPr>
+          </a:p>
+          <a:p>
+            <a:pPr marL="1146175" lvl="1" indent="-458788">
+              <a:buFont typeface="Wingdings" charset="2"/>
+              <a:buChar char="§"/>
+            </a:pPr>
+            <a:r>
+              <a:rPr lang="en-US" sz="2800" dirty="0" smtClean="0">
+                <a:solidFill>
+                  <a:srgbClr val="000000"/>
+                </a:solidFill>
+              </a:rPr>
+              <a:t>This lack of communication and cooperation created frustration and delays that resulted in an expensive waste of resources for the Enterprise</a:t>
+            </a:r>
+            <a:endParaRPr lang="en-US" sz="2800" dirty="0">
+              <a:solidFill>
+                <a:srgbClr val="000000"/>
+              </a:solidFill>
+            </a:endParaRPr>
+          </a:p>
+        </p:txBody>
+      </p:sp>
+    </p:spTree>
+    <p:extLst>
+      <p:ext uri="{BB962C8B-B14F-4D97-AF65-F5344CB8AC3E}">
+        <p14:creationId xmlns:p14="http://schemas.microsoft.com/office/powerpoint/2010/main" val="471830062"/>
+      </p:ext>
+    </p:extLst>
+  </p:cSld>
+  <p:clrMapOvr>
+    <a:masterClrMapping/>
+  </p:clrMapOvr>
+  <p:timing>
+    <p:tnLst>
+      <p:par>
+        <p:cTn xmlns:p14="http://schemas.microsoft.com/office/powerpoint/2010/main" id="1" dur="indefinite" restart="never" nodeType="tmRoot"/>
+      </p:par>
+    </p:tnLst>
+  </p:timing>
+</p:sld>
+</file>
+
+<file path=ppt/slides/slide11.xml><?xml version="1.0" encoding="utf-8"?>
+<p:sld xmlns:a="http://schemas.openxmlformats.org/drawingml/2006/main" xmlns:r="http://schemas.openxmlformats.org/officeDocument/2006/relationships" xmlns:p="http://schemas.openxmlformats.org/presentationml/2006/main">
+  <p:cSld>
+    <p:spTree>
+      <p:nvGrpSpPr>
+        <p:cNvPr id="1" name=""/>
+        <p:cNvGrpSpPr/>
+        <p:nvPr/>
+      </p:nvGrpSpPr>
+      <p:grpSpPr>
+        <a:xfrm>
+          <a:off x="0" y="0"/>
+          <a:ext cx="0" cy="0"/>
+          <a:chOff x="0" y="0"/>
+          <a:chExt cx="0" cy="0"/>
+        </a:xfrm>
+      </p:grpSpPr>
+      <p:sp>
+        <p:nvSpPr>
+          <p:cNvPr id="2" name="Title 1"/>
+          <p:cNvSpPr>
+            <a:spLocks noGrp="1"/>
+          </p:cNvSpPr>
+          <p:nvPr>
+            <p:ph type="title"/>
+          </p:nvPr>
+        </p:nvSpPr>
+        <p:spPr>
+          <a:xfrm>
+            <a:off x="714007" y="132381"/>
+            <a:ext cx="10515600" cy="1325563"/>
+          </a:xfrm>
+        </p:spPr>
+        <p:txBody>
+          <a:bodyPr>
             <a:normAutofit fontScale="90000"/>
           </a:bodyPr>
           <a:lstStyle/>
@@ -10366,7 +11263,7 @@
 </p:sld>
 </file>
 
-<file path=ppt/slides/slide11.xml><?xml version="1.0" encoding="utf-8"?>
+<file path=ppt/slides/slide12.xml><?xml version="1.0" encoding="utf-8"?>
 <p:sld xmlns:a="http://schemas.openxmlformats.org/drawingml/2006/main" xmlns:r="http://schemas.openxmlformats.org/officeDocument/2006/relationships" xmlns:p="http://schemas.openxmlformats.org/presentationml/2006/main">
   <p:cSld>
     <p:spTree>
@@ -10828,7 +11725,7 @@
 </p:sld>
 </file>
 
-<file path=ppt/slides/slide12.xml><?xml version="1.0" encoding="utf-8"?>
+<file path=ppt/slides/slide13.xml><?xml version="1.0" encoding="utf-8"?>
 <p:sld xmlns:a="http://schemas.openxmlformats.org/drawingml/2006/main" xmlns:r="http://schemas.openxmlformats.org/officeDocument/2006/relationships" xmlns:p="http://schemas.openxmlformats.org/presentationml/2006/main">
   <p:cSld>
     <p:spTree>
@@ -11317,7 +12214,7 @@
 </p:sld>
 </file>
 
-<file path=ppt/slides/slide13.xml><?xml version="1.0" encoding="utf-8"?>
+<file path=ppt/slides/slide14.xml><?xml version="1.0" encoding="utf-8"?>
 <p:sld xmlns:a="http://schemas.openxmlformats.org/drawingml/2006/main" xmlns:r="http://schemas.openxmlformats.org/officeDocument/2006/relationships" xmlns:p="http://schemas.openxmlformats.org/presentationml/2006/main">
   <p:cSld>
     <p:spTree>
@@ -11764,7 +12661,7 @@
 </p:sld>
 </file>
 
-<file path=ppt/slides/slide14.xml><?xml version="1.0" encoding="utf-8"?>
+<file path=ppt/slides/slide15.xml><?xml version="1.0" encoding="utf-8"?>
 <p:sld xmlns:a="http://schemas.openxmlformats.org/drawingml/2006/main" xmlns:r="http://schemas.openxmlformats.org/officeDocument/2006/relationships" xmlns:p="http://schemas.openxmlformats.org/presentationml/2006/main">
   <p:cSld>
     <p:spTree>
@@ -12179,7 +13076,7 @@
 </p:sld>
 </file>
 
-<file path=ppt/slides/slide15.xml><?xml version="1.0" encoding="utf-8"?>
+<file path=ppt/slides/slide16.xml><?xml version="1.0" encoding="utf-8"?>
 <p:sld xmlns:a="http://schemas.openxmlformats.org/drawingml/2006/main" xmlns:r="http://schemas.openxmlformats.org/officeDocument/2006/relationships" xmlns:p="http://schemas.openxmlformats.org/presentationml/2006/main">
   <p:cSld>
     <p:spTree>
@@ -12640,6 +13537,82 @@
       </p:grpSpPr>
       <p:sp>
         <p:nvSpPr>
+          <p:cNvPr id="4" name="Title 3"/>
+          <p:cNvSpPr>
+            <a:spLocks noGrp="1"/>
+          </p:cNvSpPr>
+          <p:nvPr>
+            <p:ph type="title"/>
+          </p:nvPr>
+        </p:nvSpPr>
+        <p:spPr/>
+        <p:txBody>
+          <a:bodyPr/>
+          <a:lstStyle/>
+          <a:p>
+            <a:r>
+              <a:rPr lang="en-US" dirty="0" smtClean="0"/>
+              <a:t>Topics</a:t>
+            </a:r>
+            <a:endParaRPr lang="en-US" dirty="0"/>
+          </a:p>
+        </p:txBody>
+      </p:sp>
+      <p:sp>
+        <p:nvSpPr>
+          <p:cNvPr id="5" name="Content Placeholder 4"/>
+          <p:cNvSpPr>
+            <a:spLocks noGrp="1"/>
+          </p:cNvSpPr>
+          <p:nvPr>
+            <p:ph sz="half" idx="1"/>
+          </p:nvPr>
+        </p:nvSpPr>
+        <p:spPr/>
+        <p:txBody>
+          <a:bodyPr/>
+          <a:lstStyle/>
+          <a:p>
+            <a:r>
+              <a:rPr lang="en-US" dirty="0" err="1" smtClean="0"/>
+              <a:t>DevOps</a:t>
+            </a:r>
+            <a:endParaRPr lang="en-US" dirty="0"/>
+          </a:p>
+        </p:txBody>
+      </p:sp>
+    </p:spTree>
+    <p:extLst>
+      <p:ext uri="{BB962C8B-B14F-4D97-AF65-F5344CB8AC3E}">
+        <p14:creationId xmlns:p14="http://schemas.microsoft.com/office/powerpoint/2010/main" val="2291382472"/>
+      </p:ext>
+    </p:extLst>
+  </p:cSld>
+  <p:clrMapOvr>
+    <a:masterClrMapping/>
+  </p:clrMapOvr>
+</p:sld>
+</file>
+
+<file path=ppt/slides/slide3.xml><?xml version="1.0" encoding="utf-8"?>
+<p:sld xmlns:a="http://schemas.openxmlformats.org/drawingml/2006/main" xmlns:r="http://schemas.openxmlformats.org/officeDocument/2006/relationships" xmlns:p="http://schemas.openxmlformats.org/presentationml/2006/main">
+  <p:cSld>
+    <p:spTree>
+      <p:nvGrpSpPr>
+        <p:cNvPr id="1" name=""/>
+        <p:cNvGrpSpPr/>
+        <p:nvPr/>
+      </p:nvGrpSpPr>
+      <p:grpSpPr>
+        <a:xfrm>
+          <a:off x="0" y="0"/>
+          <a:ext cx="0" cy="0"/>
+          <a:chOff x="0" y="0"/>
+          <a:chExt cx="0" cy="0"/>
+        </a:xfrm>
+      </p:grpSpPr>
+      <p:sp>
+        <p:nvSpPr>
           <p:cNvPr id="5" name="TextBox 4"/>
           <p:cNvSpPr txBox="1"/>
           <p:nvPr/>
@@ -13054,7 +14027,7 @@
 </p:sld>
 </file>
 
-<file path=ppt/slides/slide3.xml><?xml version="1.0" encoding="utf-8"?>
+<file path=ppt/slides/slide4.xml><?xml version="1.0" encoding="utf-8"?>
 <p:sld xmlns:a="http://schemas.openxmlformats.org/drawingml/2006/main" xmlns:r="http://schemas.openxmlformats.org/officeDocument/2006/relationships" xmlns:p="http://schemas.openxmlformats.org/presentationml/2006/main">
   <p:cSld>
     <p:spTree>
@@ -13128,7 +14101,7 @@
 </p:sld>
 </file>
 
-<file path=ppt/slides/slide4.xml><?xml version="1.0" encoding="utf-8"?>
+<file path=ppt/slides/slide5.xml><?xml version="1.0" encoding="utf-8"?>
 <p:sld xmlns:a="http://schemas.openxmlformats.org/drawingml/2006/main" xmlns:r="http://schemas.openxmlformats.org/officeDocument/2006/relationships" xmlns:p="http://schemas.openxmlformats.org/presentationml/2006/main">
   <p:cSld>
     <p:spTree>
@@ -13571,118 +14544,6 @@
 </p:sld>
 </file>
 
-<file path=ppt/slides/slide5.xml><?xml version="1.0" encoding="utf-8"?>
-<p:sld xmlns:a="http://schemas.openxmlformats.org/drawingml/2006/main" xmlns:r="http://schemas.openxmlformats.org/officeDocument/2006/relationships" xmlns:p="http://schemas.openxmlformats.org/presentationml/2006/main">
-  <p:cSld>
-    <p:spTree>
-      <p:nvGrpSpPr>
-        <p:cNvPr id="1" name=""/>
-        <p:cNvGrpSpPr/>
-        <p:nvPr/>
-      </p:nvGrpSpPr>
-      <p:grpSpPr>
-        <a:xfrm>
-          <a:off x="0" y="0"/>
-          <a:ext cx="0" cy="0"/>
-          <a:chOff x="0" y="0"/>
-          <a:chExt cx="0" cy="0"/>
-        </a:xfrm>
-      </p:grpSpPr>
-      <p:sp>
-        <p:nvSpPr>
-          <p:cNvPr id="5" name="Title 4"/>
-          <p:cNvSpPr>
-            <a:spLocks noGrp="1"/>
-          </p:cNvSpPr>
-          <p:nvPr>
-            <p:ph type="title"/>
-          </p:nvPr>
-        </p:nvSpPr>
-        <p:spPr/>
-        <p:txBody>
-          <a:bodyPr/>
-          <a:lstStyle/>
-          <a:p>
-            <a:r>
-              <a:rPr lang="en-US" dirty="0" err="1" smtClean="0"/>
-              <a:t>DevOps</a:t>
-            </a:r>
-            <a:endParaRPr lang="en-US" dirty="0"/>
-          </a:p>
-        </p:txBody>
-      </p:sp>
-      <p:sp>
-        <p:nvSpPr>
-          <p:cNvPr id="3" name="Content Placeholder 2"/>
-          <p:cNvSpPr>
-            <a:spLocks noGrp="1"/>
-          </p:cNvSpPr>
-          <p:nvPr>
-            <p:ph sz="half" idx="1"/>
-          </p:nvPr>
-        </p:nvSpPr>
-        <p:spPr/>
-        <p:txBody>
-          <a:bodyPr>
-            <a:normAutofit fontScale="70000" lnSpcReduction="20000"/>
-          </a:bodyPr>
-          <a:lstStyle/>
-          <a:p>
-            <a:pPr marL="0" lvl="2">
-              <a:lnSpc>
-                <a:spcPct val="120000"/>
-              </a:lnSpc>
-              <a:spcBef>
-                <a:spcPts val="1000"/>
-              </a:spcBef>
-            </a:pPr>
-            <a:r>
-              <a:rPr lang="en-US" sz="3100" dirty="0" smtClean="0"/>
-              <a:t>“The </a:t>
-            </a:r>
-            <a:r>
-              <a:rPr lang="en-US" sz="3100" dirty="0"/>
-              <a:t>emerging professional movement that advocates a collaborative working relationship between Development and IT Operations, resulting in the fast flow of planned work (i.e. high deploy rates), while simultaneously increasing the reliability, stability, resilience and security of the production environment</a:t>
-            </a:r>
-            <a:r>
-              <a:rPr lang="en-US" sz="3100" dirty="0" smtClean="0"/>
-              <a:t>.”</a:t>
-            </a:r>
-          </a:p>
-          <a:p>
-            <a:pPr marL="0" lvl="2" algn="r">
-              <a:lnSpc>
-                <a:spcPct val="120000"/>
-              </a:lnSpc>
-              <a:spcBef>
-                <a:spcPts val="1000"/>
-              </a:spcBef>
-            </a:pPr>
-            <a:r>
-              <a:rPr lang="en-US" sz="3600" i="0" dirty="0" smtClean="0"/>
-              <a:t>Gene</a:t>
-            </a:r>
-            <a:r>
-              <a:rPr lang="en-US" sz="3200" i="0" dirty="0" smtClean="0"/>
-              <a:t> Kim</a:t>
-            </a:r>
-            <a:endParaRPr lang="en-US" sz="3200" i="0" dirty="0"/>
-          </a:p>
-        </p:txBody>
-      </p:sp>
-    </p:spTree>
-    <p:extLst>
-      <p:ext uri="{BB962C8B-B14F-4D97-AF65-F5344CB8AC3E}">
-        <p14:creationId xmlns:p14="http://schemas.microsoft.com/office/powerpoint/2010/main" val="1645557753"/>
-      </p:ext>
-    </p:extLst>
-  </p:cSld>
-  <p:clrMapOvr>
-    <a:masterClrMapping/>
-  </p:clrMapOvr>
-</p:sld>
-</file>
-
 <file path=ppt/slides/slide6.xml><?xml version="1.0" encoding="utf-8"?>
 <p:sld xmlns:a="http://schemas.openxmlformats.org/drawingml/2006/main" xmlns:r="http://schemas.openxmlformats.org/officeDocument/2006/relationships" xmlns:p="http://schemas.openxmlformats.org/presentationml/2006/main">
   <p:cSld>
@@ -13702,6 +14563,118 @@
       </p:grpSpPr>
       <p:sp>
         <p:nvSpPr>
+          <p:cNvPr id="5" name="Title 4"/>
+          <p:cNvSpPr>
+            <a:spLocks noGrp="1"/>
+          </p:cNvSpPr>
+          <p:nvPr>
+            <p:ph type="title"/>
+          </p:nvPr>
+        </p:nvSpPr>
+        <p:spPr/>
+        <p:txBody>
+          <a:bodyPr/>
+          <a:lstStyle/>
+          <a:p>
+            <a:r>
+              <a:rPr lang="en-US" dirty="0" err="1" smtClean="0"/>
+              <a:t>DevOps</a:t>
+            </a:r>
+            <a:endParaRPr lang="en-US" dirty="0"/>
+          </a:p>
+        </p:txBody>
+      </p:sp>
+      <p:sp>
+        <p:nvSpPr>
+          <p:cNvPr id="3" name="Content Placeholder 2"/>
+          <p:cNvSpPr>
+            <a:spLocks noGrp="1"/>
+          </p:cNvSpPr>
+          <p:nvPr>
+            <p:ph sz="half" idx="1"/>
+          </p:nvPr>
+        </p:nvSpPr>
+        <p:spPr/>
+        <p:txBody>
+          <a:bodyPr>
+            <a:normAutofit fontScale="70000" lnSpcReduction="20000"/>
+          </a:bodyPr>
+          <a:lstStyle/>
+          <a:p>
+            <a:pPr marL="0" lvl="2">
+              <a:lnSpc>
+                <a:spcPct val="120000"/>
+              </a:lnSpc>
+              <a:spcBef>
+                <a:spcPts val="1000"/>
+              </a:spcBef>
+            </a:pPr>
+            <a:r>
+              <a:rPr lang="en-US" sz="3100" dirty="0" smtClean="0"/>
+              <a:t>“The </a:t>
+            </a:r>
+            <a:r>
+              <a:rPr lang="en-US" sz="3100" dirty="0"/>
+              <a:t>emerging professional movement that advocates a collaborative working relationship between Development and IT Operations, resulting in the fast flow of planned work (i.e. high deploy rates), while simultaneously increasing the reliability, stability, resilience and security of the production environment</a:t>
+            </a:r>
+            <a:r>
+              <a:rPr lang="en-US" sz="3100" dirty="0" smtClean="0"/>
+              <a:t>.”</a:t>
+            </a:r>
+          </a:p>
+          <a:p>
+            <a:pPr marL="0" lvl="2" algn="r">
+              <a:lnSpc>
+                <a:spcPct val="120000"/>
+              </a:lnSpc>
+              <a:spcBef>
+                <a:spcPts val="1000"/>
+              </a:spcBef>
+            </a:pPr>
+            <a:r>
+              <a:rPr lang="en-US" sz="3600" i="0" dirty="0" smtClean="0"/>
+              <a:t>Gene</a:t>
+            </a:r>
+            <a:r>
+              <a:rPr lang="en-US" sz="3200" i="0" dirty="0" smtClean="0"/>
+              <a:t> Kim</a:t>
+            </a:r>
+            <a:endParaRPr lang="en-US" sz="3200" i="0" dirty="0"/>
+          </a:p>
+        </p:txBody>
+      </p:sp>
+    </p:spTree>
+    <p:extLst>
+      <p:ext uri="{BB962C8B-B14F-4D97-AF65-F5344CB8AC3E}">
+        <p14:creationId xmlns:p14="http://schemas.microsoft.com/office/powerpoint/2010/main" val="1645557753"/>
+      </p:ext>
+    </p:extLst>
+  </p:cSld>
+  <p:clrMapOvr>
+    <a:masterClrMapping/>
+  </p:clrMapOvr>
+</p:sld>
+</file>
+
+<file path=ppt/slides/slide7.xml><?xml version="1.0" encoding="utf-8"?>
+<p:sld xmlns:a="http://schemas.openxmlformats.org/drawingml/2006/main" xmlns:r="http://schemas.openxmlformats.org/officeDocument/2006/relationships" xmlns:p="http://schemas.openxmlformats.org/presentationml/2006/main">
+  <p:cSld>
+    <p:spTree>
+      <p:nvGrpSpPr>
+        <p:cNvPr id="1" name=""/>
+        <p:cNvGrpSpPr/>
+        <p:nvPr/>
+      </p:nvGrpSpPr>
+      <p:grpSpPr>
+        <a:xfrm>
+          <a:off x="0" y="0"/>
+          <a:ext cx="0" cy="0"/>
+          <a:chOff x="0" y="0"/>
+          <a:chExt cx="0" cy="0"/>
+        </a:xfrm>
+      </p:grpSpPr>
+      <p:sp>
+        <p:nvSpPr>
           <p:cNvPr id="2" name="Title 1"/>
           <p:cNvSpPr>
             <a:spLocks noGrp="1"/>
@@ -13797,7 +14770,7 @@
 </p:sld>
 </file>
 
-<file path=ppt/slides/slide7.xml><?xml version="1.0" encoding="utf-8"?>
+<file path=ppt/slides/slide8.xml><?xml version="1.0" encoding="utf-8"?>
 <p:sld xmlns:a="http://schemas.openxmlformats.org/drawingml/2006/main" xmlns:r="http://schemas.openxmlformats.org/officeDocument/2006/relationships" xmlns:p="http://schemas.openxmlformats.org/presentationml/2006/main">
   <p:cSld>
     <p:spTree>
@@ -14213,7 +15186,7 @@
 </p:sld>
 </file>
 
-<file path=ppt/slides/slide8.xml><?xml version="1.0" encoding="utf-8"?>
+<file path=ppt/slides/slide9.xml><?xml version="1.0" encoding="utf-8"?>
 <p:sld xmlns:a="http://schemas.openxmlformats.org/drawingml/2006/main" xmlns:r="http://schemas.openxmlformats.org/officeDocument/2006/relationships" xmlns:p="http://schemas.openxmlformats.org/presentationml/2006/main">
   <p:cSld>
     <p:spTree>
@@ -14629,418 +15602,6 @@
 </p:sld>
 </file>
 
-<file path=ppt/slides/slide9.xml><?xml version="1.0" encoding="utf-8"?>
-<p:sld xmlns:a="http://schemas.openxmlformats.org/drawingml/2006/main" xmlns:r="http://schemas.openxmlformats.org/officeDocument/2006/relationships" xmlns:p="http://schemas.openxmlformats.org/presentationml/2006/main">
-  <p:cSld>
-    <p:spTree>
-      <p:nvGrpSpPr>
-        <p:cNvPr id="1" name=""/>
-        <p:cNvGrpSpPr/>
-        <p:nvPr/>
-      </p:nvGrpSpPr>
-      <p:grpSpPr>
-        <a:xfrm>
-          <a:off x="0" y="0"/>
-          <a:ext cx="0" cy="0"/>
-          <a:chOff x="0" y="0"/>
-          <a:chExt cx="0" cy="0"/>
-        </a:xfrm>
-      </p:grpSpPr>
-      <p:sp>
-        <p:nvSpPr>
-          <p:cNvPr id="2" name="Title 1"/>
-          <p:cNvSpPr>
-            <a:spLocks noGrp="1"/>
-          </p:cNvSpPr>
-          <p:nvPr>
-            <p:ph type="title"/>
-          </p:nvPr>
-        </p:nvSpPr>
-        <p:spPr>
-          <a:xfrm>
-            <a:off x="714007" y="132381"/>
-            <a:ext cx="10515600" cy="1325563"/>
-          </a:xfrm>
-        </p:spPr>
-        <p:txBody>
-          <a:bodyPr>
-            <a:normAutofit/>
-          </a:bodyPr>
-          <a:lstStyle/>
-          <a:p>
-            <a:r>
-              <a:rPr lang="en-US" sz="4800" dirty="0" smtClean="0"/>
-              <a:t>What Led To The Creation of DevOps</a:t>
-            </a:r>
-            <a:endParaRPr lang="en-US" sz="4800" dirty="0"/>
-          </a:p>
-        </p:txBody>
-      </p:sp>
-      <p:grpSp>
-        <p:nvGrpSpPr>
-          <p:cNvPr id="30" name="Group 29"/>
-          <p:cNvGrpSpPr/>
-          <p:nvPr/>
-        </p:nvGrpSpPr>
-        <p:grpSpPr>
-          <a:xfrm>
-            <a:off x="1" y="1947672"/>
-            <a:ext cx="12191999" cy="791753"/>
-            <a:chOff x="979715" y="1950630"/>
-            <a:chExt cx="9998962" cy="832911"/>
-          </a:xfrm>
-        </p:grpSpPr>
-        <p:sp>
-          <p:nvSpPr>
-            <p:cNvPr id="33" name="Rectangle 32"/>
-            <p:cNvSpPr/>
-            <p:nvPr/>
-          </p:nvSpPr>
-          <p:spPr>
-            <a:xfrm>
-              <a:off x="979715" y="1950630"/>
-              <a:ext cx="9998962" cy="832911"/>
-            </a:xfrm>
-            <a:prstGeom prst="rect">
-              <a:avLst/>
-            </a:prstGeom>
-            <a:solidFill>
-              <a:srgbClr val="0070C0"/>
-            </a:solidFill>
-            <a:ln w="9525" cap="flat" cmpd="sng" algn="ctr">
-              <a:noFill/>
-              <a:prstDash val="solid"/>
-            </a:ln>
-            <a:effectLst/>
-          </p:spPr>
-          <p:txBody>
-            <a:bodyPr rtlCol="0" anchor="ctr"/>
-            <a:lstStyle/>
-            <a:p>
-              <a:pPr marL="0" marR="0" lvl="0" indent="0" algn="ctr" defTabSz="914400" eaLnBrk="1" fontAlgn="auto" latinLnBrk="0" hangingPunct="1">
-                <a:lnSpc>
-                  <a:spcPct val="100000"/>
-                </a:lnSpc>
-                <a:spcBef>
-                  <a:spcPts val="0"/>
-                </a:spcBef>
-                <a:spcAft>
-                  <a:spcPts val="0"/>
-                </a:spcAft>
-                <a:buClrTx/>
-                <a:buSzTx/>
-                <a:buFont typeface="Arial" panose="020B0604020202020204" pitchFamily="34" charset="0"/>
-                <a:buNone/>
-                <a:tabLst/>
-                <a:defRPr/>
-              </a:pPr>
-              <a:endParaRPr kumimoji="0" lang="en-US" sz="4000" i="1" u="none" strike="noStrike" kern="0" cap="none" spc="0" normalizeH="0" baseline="0" noProof="0" dirty="0">
-                <a:ln>
-                  <a:noFill/>
-                </a:ln>
-                <a:solidFill>
-                  <a:prstClr val="white"/>
-                </a:solidFill>
-                <a:effectLst/>
-                <a:uLnTx/>
-                <a:uFillTx/>
-                <a:latin typeface="+mj-lt"/>
-              </a:endParaRPr>
-            </a:p>
-          </p:txBody>
-        </p:sp>
-        <p:sp>
-          <p:nvSpPr>
-            <p:cNvPr id="35" name="Content Placeholder 2"/>
-            <p:cNvSpPr txBox="1">
-              <a:spLocks/>
-            </p:cNvSpPr>
-            <p:nvPr/>
-          </p:nvSpPr>
-          <p:spPr>
-            <a:xfrm>
-              <a:off x="1555276" y="1950630"/>
-              <a:ext cx="9295782" cy="832911"/>
-            </a:xfrm>
-            <a:prstGeom prst="rect">
-              <a:avLst/>
-            </a:prstGeom>
-          </p:spPr>
-          <p:txBody>
-            <a:bodyPr anchor="ctr"/>
-            <a:lstStyle>
-              <a:lvl1pPr marL="0" indent="0" algn="ctr" defTabSz="914400" rtl="0" eaLnBrk="1" latinLnBrk="0" hangingPunct="1">
-                <a:lnSpc>
-                  <a:spcPct val="90000"/>
-                </a:lnSpc>
-                <a:spcBef>
-                  <a:spcPts val="1000"/>
-                </a:spcBef>
-                <a:buFont typeface="Arial" panose="020B0604020202020204" pitchFamily="34" charset="0"/>
-                <a:buNone/>
-                <a:defRPr sz="2800" i="1" kern="1200">
-                  <a:solidFill>
-                    <a:schemeClr val="bg1"/>
-                  </a:solidFill>
-                  <a:latin typeface="+mn-lt"/>
-                  <a:ea typeface="+mn-ea"/>
-                  <a:cs typeface="+mn-cs"/>
-                </a:defRPr>
-              </a:lvl1pPr>
-              <a:lvl2pPr marL="457200" indent="0" algn="ctr" defTabSz="914400" rtl="0" eaLnBrk="1" latinLnBrk="0" hangingPunct="1">
-                <a:lnSpc>
-                  <a:spcPct val="90000"/>
-                </a:lnSpc>
-                <a:spcBef>
-                  <a:spcPts val="500"/>
-                </a:spcBef>
-                <a:buFont typeface="Arial" panose="020B0604020202020204" pitchFamily="34" charset="0"/>
-                <a:buNone/>
-                <a:defRPr sz="2400" i="1" kern="1200">
-                  <a:solidFill>
-                    <a:schemeClr val="bg1"/>
-                  </a:solidFill>
-                  <a:latin typeface="+mn-lt"/>
-                  <a:ea typeface="+mn-ea"/>
-                  <a:cs typeface="+mn-cs"/>
-                </a:defRPr>
-              </a:lvl2pPr>
-              <a:lvl3pPr marL="914400" indent="0" algn="ctr" defTabSz="914400" rtl="0" eaLnBrk="1" latinLnBrk="0" hangingPunct="1">
-                <a:lnSpc>
-                  <a:spcPct val="90000"/>
-                </a:lnSpc>
-                <a:spcBef>
-                  <a:spcPts val="500"/>
-                </a:spcBef>
-                <a:buFont typeface="Arial" panose="020B0604020202020204" pitchFamily="34" charset="0"/>
-                <a:buNone/>
-                <a:defRPr sz="2000" i="1" kern="1200">
-                  <a:solidFill>
-                    <a:schemeClr val="bg1"/>
-                  </a:solidFill>
-                  <a:latin typeface="+mn-lt"/>
-                  <a:ea typeface="+mn-ea"/>
-                  <a:cs typeface="+mn-cs"/>
-                </a:defRPr>
-              </a:lvl3pPr>
-              <a:lvl4pPr marL="1371600" indent="0" algn="ctr" defTabSz="914400" rtl="0" eaLnBrk="1" latinLnBrk="0" hangingPunct="1">
-                <a:lnSpc>
-                  <a:spcPct val="90000"/>
-                </a:lnSpc>
-                <a:spcBef>
-                  <a:spcPts val="500"/>
-                </a:spcBef>
-                <a:buFont typeface="Arial" panose="020B0604020202020204" pitchFamily="34" charset="0"/>
-                <a:buNone/>
-                <a:defRPr sz="1800" i="1" kern="1200">
-                  <a:solidFill>
-                    <a:schemeClr val="bg1"/>
-                  </a:solidFill>
-                  <a:latin typeface="+mn-lt"/>
-                  <a:ea typeface="+mn-ea"/>
-                  <a:cs typeface="+mn-cs"/>
-                </a:defRPr>
-              </a:lvl4pPr>
-              <a:lvl5pPr marL="1828800" indent="0" algn="ctr" defTabSz="914400" rtl="0" eaLnBrk="1" latinLnBrk="0" hangingPunct="1">
-                <a:lnSpc>
-                  <a:spcPct val="90000"/>
-                </a:lnSpc>
-                <a:spcBef>
-                  <a:spcPts val="500"/>
-                </a:spcBef>
-                <a:buFont typeface="Arial" panose="020B0604020202020204" pitchFamily="34" charset="0"/>
-                <a:buNone/>
-                <a:defRPr sz="1800" i="1" kern="1200">
-                  <a:solidFill>
-                    <a:schemeClr val="bg1"/>
-                  </a:solidFill>
-                  <a:latin typeface="+mn-lt"/>
-                  <a:ea typeface="+mn-ea"/>
-                  <a:cs typeface="+mn-cs"/>
-                </a:defRPr>
-              </a:lvl5pPr>
-              <a:lvl6pPr marL="2514600" indent="-228600" algn="l" defTabSz="914400" rtl="0" eaLnBrk="1" latinLnBrk="0" hangingPunct="1">
-                <a:lnSpc>
-                  <a:spcPct val="90000"/>
-                </a:lnSpc>
-                <a:spcBef>
-                  <a:spcPts val="500"/>
-                </a:spcBef>
-                <a:buFont typeface="Arial" panose="020B0604020202020204" pitchFamily="34" charset="0"/>
-                <a:buChar char="•"/>
-                <a:defRPr sz="1800" kern="1200">
-                  <a:solidFill>
-                    <a:schemeClr val="tx1"/>
-                  </a:solidFill>
-                  <a:latin typeface="+mn-lt"/>
-                  <a:ea typeface="+mn-ea"/>
-                  <a:cs typeface="+mn-cs"/>
-                </a:defRPr>
-              </a:lvl6pPr>
-              <a:lvl7pPr marL="2971800" indent="-228600" algn="l" defTabSz="914400" rtl="0" eaLnBrk="1" latinLnBrk="0" hangingPunct="1">
-                <a:lnSpc>
-                  <a:spcPct val="90000"/>
-                </a:lnSpc>
-                <a:spcBef>
-                  <a:spcPts val="500"/>
-                </a:spcBef>
-                <a:buFont typeface="Arial" panose="020B0604020202020204" pitchFamily="34" charset="0"/>
-                <a:buChar char="•"/>
-                <a:defRPr sz="1800" kern="1200">
-                  <a:solidFill>
-                    <a:schemeClr val="tx1"/>
-                  </a:solidFill>
-                  <a:latin typeface="+mn-lt"/>
-                  <a:ea typeface="+mn-ea"/>
-                  <a:cs typeface="+mn-cs"/>
-                </a:defRPr>
-              </a:lvl7pPr>
-              <a:lvl8pPr marL="3429000" indent="-228600" algn="l" defTabSz="914400" rtl="0" eaLnBrk="1" latinLnBrk="0" hangingPunct="1">
-                <a:lnSpc>
-                  <a:spcPct val="90000"/>
-                </a:lnSpc>
-                <a:spcBef>
-                  <a:spcPts val="500"/>
-                </a:spcBef>
-                <a:buFont typeface="Arial" panose="020B0604020202020204" pitchFamily="34" charset="0"/>
-                <a:buChar char="•"/>
-                <a:defRPr sz="1800" kern="1200">
-                  <a:solidFill>
-                    <a:schemeClr val="tx1"/>
-                  </a:solidFill>
-                  <a:latin typeface="+mn-lt"/>
-                  <a:ea typeface="+mn-ea"/>
-                  <a:cs typeface="+mn-cs"/>
-                </a:defRPr>
-              </a:lvl8pPr>
-              <a:lvl9pPr marL="3886200" indent="-228600" algn="l" defTabSz="914400" rtl="0" eaLnBrk="1" latinLnBrk="0" hangingPunct="1">
-                <a:lnSpc>
-                  <a:spcPct val="90000"/>
-                </a:lnSpc>
-                <a:spcBef>
-                  <a:spcPts val="500"/>
-                </a:spcBef>
-                <a:buFont typeface="Arial" panose="020B0604020202020204" pitchFamily="34" charset="0"/>
-                <a:buChar char="•"/>
-                <a:defRPr sz="1800" kern="1200">
-                  <a:solidFill>
-                    <a:schemeClr val="tx1"/>
-                  </a:solidFill>
-                  <a:latin typeface="+mn-lt"/>
-                  <a:ea typeface="+mn-ea"/>
-                  <a:cs typeface="+mn-cs"/>
-                </a:defRPr>
-              </a:lvl9pPr>
-            </a:lstStyle>
-            <a:p>
-              <a:pPr algn="l"/>
-              <a:r>
-                <a:rPr lang="en-US" i="0" dirty="0" smtClean="0"/>
-                <a:t>There was an historical separation between the two groups	</a:t>
-              </a:r>
-              <a:endParaRPr lang="en-US" i="0" dirty="0"/>
-            </a:p>
-          </p:txBody>
-        </p:sp>
-      </p:grpSp>
-      <p:sp>
-        <p:nvSpPr>
-          <p:cNvPr id="54" name="Rectangle 53"/>
-          <p:cNvSpPr/>
-          <p:nvPr/>
-        </p:nvSpPr>
-        <p:spPr>
-          <a:xfrm>
-            <a:off x="0" y="2225737"/>
-            <a:ext cx="12192000" cy="3525279"/>
-          </a:xfrm>
-          <a:prstGeom prst="rect">
-            <a:avLst/>
-          </a:prstGeom>
-          <a:noFill/>
-          <a:ln>
-            <a:noFill/>
-          </a:ln>
-        </p:spPr>
-        <p:style>
-          <a:lnRef idx="2">
-            <a:schemeClr val="accent1">
-              <a:shade val="50000"/>
-            </a:schemeClr>
-          </a:lnRef>
-          <a:fillRef idx="1">
-            <a:schemeClr val="accent1"/>
-          </a:fillRef>
-          <a:effectRef idx="0">
-            <a:schemeClr val="accent1"/>
-          </a:effectRef>
-          <a:fontRef idx="minor">
-            <a:schemeClr val="lt1"/>
-          </a:fontRef>
-        </p:style>
-        <p:txBody>
-          <a:bodyPr rtlCol="0" anchor="ctr"/>
-          <a:lstStyle/>
-          <a:p>
-            <a:pPr marL="1146175" lvl="1" indent="-458788">
-              <a:buFont typeface="Wingdings" charset="2"/>
-              <a:buChar char="§"/>
-            </a:pPr>
-            <a:r>
-              <a:rPr lang="en-US" sz="2800" dirty="0" smtClean="0">
-                <a:solidFill>
-                  <a:srgbClr val="000000"/>
-                </a:solidFill>
-              </a:rPr>
-              <a:t>These groups did not traditionally work well together, with each group often seeing the other as an adversary, rather then an ally</a:t>
-            </a:r>
-            <a:endParaRPr lang="en-US" sz="2800" dirty="0">
-              <a:solidFill>
-                <a:srgbClr val="000000"/>
-              </a:solidFill>
-            </a:endParaRPr>
-          </a:p>
-          <a:p>
-            <a:pPr marL="1146175" lvl="1" indent="-458788">
-              <a:buFont typeface="Wingdings" charset="2"/>
-              <a:buChar char="§"/>
-            </a:pPr>
-            <a:r>
-              <a:rPr lang="en-US" sz="2800" dirty="0" smtClean="0">
-                <a:solidFill>
-                  <a:srgbClr val="000000"/>
-                </a:solidFill>
-              </a:rPr>
-              <a:t>This lack of communication and cooperation created frustration and delays that resulted in an expensive waste of resources for the Enterprise</a:t>
-            </a:r>
-            <a:endParaRPr lang="en-US" sz="2800" dirty="0">
-              <a:solidFill>
-                <a:srgbClr val="000000"/>
-              </a:solidFill>
-            </a:endParaRPr>
-          </a:p>
-        </p:txBody>
-      </p:sp>
-    </p:spTree>
-    <p:extLst>
-      <p:ext uri="{BB962C8B-B14F-4D97-AF65-F5344CB8AC3E}">
-        <p14:creationId xmlns:p14="http://schemas.microsoft.com/office/powerpoint/2010/main" val="471830062"/>
-      </p:ext>
-    </p:extLst>
-  </p:cSld>
-  <p:clrMapOvr>
-    <a:masterClrMapping/>
-  </p:clrMapOvr>
-  <p:timing>
-    <p:tnLst>
-      <p:par>
-        <p:cTn xmlns:p14="http://schemas.microsoft.com/office/powerpoint/2010/main" id="1" dur="indefinite" restart="never" nodeType="tmRoot"/>
-      </p:par>
-    </p:tnLst>
-  </p:timing>
-</p:sld>
-</file>
-
 <file path=ppt/theme/theme1.xml><?xml version="1.0" encoding="utf-8"?>
 <a:theme xmlns:a="http://schemas.openxmlformats.org/drawingml/2006/main" name="Office Theme">
   <a:themeElements>
@@ -15236,7 +15797,7 @@
   <a:extraClrSchemeLst/>
   <a:extLst>
     <a:ext uri="{05A4C25C-085E-4340-85A3-A5531E510DB2}">
-      <thm15:themeFamily xmlns="" xmlns:thm15="http://schemas.microsoft.com/office/thememl/2012/main" name="Office Theme" id="{62F939B6-93AF-4DB8-9C6B-D6C7DFDC589F}" vid="{4A3C46E8-61CC-4603-A589-7422A47A8E4A}"/>
+      <thm15:themeFamily xmlns:thm15="http://schemas.microsoft.com/office/thememl/2012/main" xmlns="" name="Office Theme" id="{62F939B6-93AF-4DB8-9C6B-D6C7DFDC589F}" vid="{4A3C46E8-61CC-4603-A589-7422A47A8E4A}"/>
     </a:ext>
   </a:extLst>
 </a:theme>
@@ -15505,7 +16066,7 @@
   <a:extraClrSchemeLst/>
   <a:extLst>
     <a:ext uri="{05A4C25C-085E-4340-85A3-A5531E510DB2}">
-      <thm15:themeFamily xmlns="" xmlns:thm15="http://schemas.microsoft.com/office/thememl/2012/main" name="Office Theme" id="{62F939B6-93AF-4DB8-9C6B-D6C7DFDC589F}" vid="{4A3C46E8-61CC-4603-A589-7422A47A8E4A}"/>
+      <thm15:themeFamily xmlns:thm15="http://schemas.microsoft.com/office/thememl/2012/main" xmlns="" name="Office Theme" id="{62F939B6-93AF-4DB8-9C6B-D6C7DFDC589F}" vid="{4A3C46E8-61CC-4603-A589-7422A47A8E4A}"/>
     </a:ext>
   </a:extLst>
 </a:theme>
@@ -15800,7 +16361,7 @@
   <a:extraClrSchemeLst/>
   <a:extLst>
     <a:ext uri="{05A4C25C-085E-4340-85A3-A5531E510DB2}">
-      <thm15:themeFamily xmlns="" xmlns:thm15="http://schemas.microsoft.com/office/thememl/2012/main" name="Office Theme" id="{62F939B6-93AF-4DB8-9C6B-D6C7DFDC589F}" vid="{4A3C46E8-61CC-4603-A589-7422A47A8E4A}"/>
+      <thm15:themeFamily xmlns:thm15="http://schemas.microsoft.com/office/thememl/2012/main" xmlns="" name="Office Theme" id="{62F939B6-93AF-4DB8-9C6B-D6C7DFDC589F}" vid="{4A3C46E8-61CC-4603-A589-7422A47A8E4A}"/>
     </a:ext>
   </a:extLst>
 </a:theme>

</xml_diff>

<commit_message>
module 7 changes done
</commit_message>
<xml_diff>
--- a/Complimentary Course Content/Module7/Lessons/Module7_Lesson1 What is DevOps.pptx
+++ b/Complimentary Course Content/Module7/Lessons/Module7_Lesson1 What is DevOps.pptx
@@ -125,7 +125,7 @@
   </p:defaultTextStyle>
   <p:extLst>
     <p:ext uri="{EFAFB233-063F-42B5-8137-9DF3F51BA10A}">
-      <p15:sldGuideLst xmlns="" xmlns:p15="http://schemas.microsoft.com/office/powerpoint/2012/main">
+      <p15:sldGuideLst xmlns:p15="http://schemas.microsoft.com/office/powerpoint/2012/main" xmlns="">
         <p15:guide id="1" orient="horz" pos="2184" userDrawn="1">
           <p15:clr>
             <a:srgbClr val="A4A3A4"/>
@@ -246,7 +246,7 @@
             <a:fld id="{49B60EF2-7028-489F-85D8-FE86CD7CF2A0}" type="datetimeFigureOut">
               <a:rPr lang="en-US" smtClean="0"/>
               <a:pPr/>
-              <a:t>6/30/16</a:t>
+              <a:t>7/7/16</a:t>
             </a:fld>
             <a:endParaRPr lang="en-US"/>
           </a:p>
@@ -2717,7 +2717,7 @@
             <a:fld id="{0459C166-16D3-4A25-A2F8-C51E0E346B22}" type="datetimeFigureOut">
               <a:rPr lang="en-US" smtClean="0"/>
               <a:pPr/>
-              <a:t>6/30/16</a:t>
+              <a:t>7/7/16</a:t>
             </a:fld>
             <a:endParaRPr lang="en-US"/>
           </a:p>
@@ -2887,7 +2887,7 @@
             <a:fld id="{0459C166-16D3-4A25-A2F8-C51E0E346B22}" type="datetimeFigureOut">
               <a:rPr lang="en-US" smtClean="0"/>
               <a:pPr/>
-              <a:t>6/30/16</a:t>
+              <a:t>7/7/16</a:t>
             </a:fld>
             <a:endParaRPr lang="en-US"/>
           </a:p>
@@ -3067,7 +3067,7 @@
             <a:fld id="{0459C166-16D3-4A25-A2F8-C51E0E346B22}" type="datetimeFigureOut">
               <a:rPr lang="en-US" smtClean="0"/>
               <a:pPr/>
-              <a:t>6/30/16</a:t>
+              <a:t>7/7/16</a:t>
             </a:fld>
             <a:endParaRPr lang="en-US"/>
           </a:p>
@@ -3284,7 +3284,7 @@
                 <a:latin typeface="Segoe UI"/>
               </a:rPr>
               <a:pPr/>
-              <a:t>6/30/16</a:t>
+              <a:t>7/7/16</a:t>
             </a:fld>
             <a:endParaRPr lang="en-US">
               <a:solidFill>
@@ -3489,7 +3489,7 @@
                 <a:latin typeface="Segoe UI"/>
               </a:rPr>
               <a:pPr/>
-              <a:t>6/30/16</a:t>
+              <a:t>7/7/16</a:t>
             </a:fld>
             <a:endParaRPr lang="en-US">
               <a:solidFill>
@@ -3787,7 +3787,7 @@
                 <a:latin typeface="Segoe UI"/>
               </a:rPr>
               <a:pPr/>
-              <a:t>6/30/16</a:t>
+              <a:t>7/7/16</a:t>
             </a:fld>
             <a:endParaRPr lang="en-US">
               <a:solidFill>
@@ -4131,7 +4131,7 @@
                 <a:latin typeface="Segoe UI"/>
               </a:rPr>
               <a:pPr/>
-              <a:t>6/30/16</a:t>
+              <a:t>7/7/16</a:t>
             </a:fld>
             <a:endParaRPr lang="en-US">
               <a:solidFill>
@@ -4506,7 +4506,7 @@
                 <a:latin typeface="Segoe UI"/>
               </a:rPr>
               <a:pPr/>
-              <a:t>6/30/16</a:t>
+              <a:t>7/7/16</a:t>
             </a:fld>
             <a:endParaRPr lang="en-US">
               <a:solidFill>
@@ -5382,7 +5382,7 @@
             <a:fld id="{0459C166-16D3-4A25-A2F8-C51E0E346B22}" type="datetimeFigureOut">
               <a:rPr lang="en-US" smtClean="0"/>
               <a:pPr/>
-              <a:t>6/30/16</a:t>
+              <a:t>7/7/16</a:t>
             </a:fld>
             <a:endParaRPr lang="en-US"/>
           </a:p>
@@ -5620,7 +5620,7 @@
                 <a:latin typeface="Segoe UI"/>
               </a:rPr>
               <a:pPr/>
-              <a:t>6/30/16</a:t>
+              <a:t>7/7/16</a:t>
             </a:fld>
             <a:endParaRPr lang="en-US">
               <a:solidFill>
@@ -6021,7 +6021,7 @@
                 <a:latin typeface="Segoe UI"/>
               </a:rPr>
               <a:pPr/>
-              <a:t>6/30/16</a:t>
+              <a:t>7/7/16</a:t>
             </a:fld>
             <a:endParaRPr lang="en-US">
               <a:solidFill>
@@ -6175,7 +6175,7 @@
                 <a:latin typeface="Segoe UI"/>
               </a:rPr>
               <a:pPr/>
-              <a:t>6/30/16</a:t>
+              <a:t>7/7/16</a:t>
             </a:fld>
             <a:endParaRPr lang="en-US">
               <a:solidFill>
@@ -6307,7 +6307,7 @@
                 <a:latin typeface="Segoe UI"/>
               </a:rPr>
               <a:pPr/>
-              <a:t>6/30/16</a:t>
+              <a:t>7/7/16</a:t>
             </a:fld>
             <a:endParaRPr lang="en-US">
               <a:solidFill>
@@ -6619,7 +6619,7 @@
                 <a:latin typeface="Segoe UI"/>
               </a:rPr>
               <a:pPr/>
-              <a:t>6/30/16</a:t>
+              <a:t>7/7/16</a:t>
             </a:fld>
             <a:endParaRPr lang="en-US">
               <a:solidFill>
@@ -6908,7 +6908,7 @@
                 <a:latin typeface="Segoe UI"/>
               </a:rPr>
               <a:pPr/>
-              <a:t>6/30/16</a:t>
+              <a:t>7/7/16</a:t>
             </a:fld>
             <a:endParaRPr lang="en-US">
               <a:solidFill>
@@ -7113,7 +7113,7 @@
                 <a:latin typeface="Segoe UI"/>
               </a:rPr>
               <a:pPr/>
-              <a:t>6/30/16</a:t>
+              <a:t>7/7/16</a:t>
             </a:fld>
             <a:endParaRPr lang="en-US">
               <a:solidFill>
@@ -7328,7 +7328,7 @@
                 <a:latin typeface="Segoe UI"/>
               </a:rPr>
               <a:pPr/>
-              <a:t>6/30/16</a:t>
+              <a:t>7/7/16</a:t>
             </a:fld>
             <a:endParaRPr lang="en-US">
               <a:solidFill>
@@ -7623,7 +7623,7 @@
             <a:fld id="{0459C166-16D3-4A25-A2F8-C51E0E346B22}" type="datetimeFigureOut">
               <a:rPr lang="en-US" smtClean="0"/>
               <a:pPr/>
-              <a:t>6/30/16</a:t>
+              <a:t>7/7/16</a:t>
             </a:fld>
             <a:endParaRPr lang="en-US"/>
           </a:p>
@@ -7870,7 +7870,7 @@
             <a:fld id="{0459C166-16D3-4A25-A2F8-C51E0E346B22}" type="datetimeFigureOut">
               <a:rPr lang="en-US" smtClean="0"/>
               <a:pPr/>
-              <a:t>6/30/16</a:t>
+              <a:t>7/7/16</a:t>
             </a:fld>
             <a:endParaRPr lang="en-US"/>
           </a:p>
@@ -8236,7 +8236,7 @@
             <a:fld id="{0459C166-16D3-4A25-A2F8-C51E0E346B22}" type="datetimeFigureOut">
               <a:rPr lang="en-US" smtClean="0"/>
               <a:pPr/>
-              <a:t>6/30/16</a:t>
+              <a:t>7/7/16</a:t>
             </a:fld>
             <a:endParaRPr lang="en-US"/>
           </a:p>
@@ -8355,7 +8355,7 @@
             <a:fld id="{0459C166-16D3-4A25-A2F8-C51E0E346B22}" type="datetimeFigureOut">
               <a:rPr lang="en-US" smtClean="0"/>
               <a:pPr/>
-              <a:t>6/30/16</a:t>
+              <a:t>7/7/16</a:t>
             </a:fld>
             <a:endParaRPr lang="en-US"/>
           </a:p>
@@ -8452,7 +8452,7 @@
             <a:fld id="{0459C166-16D3-4A25-A2F8-C51E0E346B22}" type="datetimeFigureOut">
               <a:rPr lang="en-US" smtClean="0"/>
               <a:pPr/>
-              <a:t>6/30/16</a:t>
+              <a:t>7/7/16</a:t>
             </a:fld>
             <a:endParaRPr lang="en-US"/>
           </a:p>
@@ -8729,7 +8729,7 @@
             <a:fld id="{0459C166-16D3-4A25-A2F8-C51E0E346B22}" type="datetimeFigureOut">
               <a:rPr lang="en-US" smtClean="0"/>
               <a:pPr/>
-              <a:t>6/30/16</a:t>
+              <a:t>7/7/16</a:t>
             </a:fld>
             <a:endParaRPr lang="en-US"/>
           </a:p>
@@ -8983,7 +8983,7 @@
             <a:fld id="{0459C166-16D3-4A25-A2F8-C51E0E346B22}" type="datetimeFigureOut">
               <a:rPr lang="en-US" smtClean="0"/>
               <a:pPr/>
-              <a:t>6/30/16</a:t>
+              <a:t>7/7/16</a:t>
             </a:fld>
             <a:endParaRPr lang="en-US"/>
           </a:p>
@@ -9196,7 +9196,7 @@
             <a:fld id="{0459C166-16D3-4A25-A2F8-C51E0E346B22}" type="datetimeFigureOut">
               <a:rPr lang="en-US" smtClean="0"/>
               <a:pPr/>
-              <a:t>6/30/16</a:t>
+              <a:t>7/7/16</a:t>
             </a:fld>
             <a:endParaRPr lang="en-US"/>
           </a:p>
@@ -9743,7 +9743,7 @@
                 <a:latin typeface="Segoe UI"/>
               </a:rPr>
               <a:pPr/>
-              <a:t>6/30/16</a:t>
+              <a:t>7/7/16</a:t>
             </a:fld>
             <a:endParaRPr lang="en-US">
               <a:solidFill>
@@ -15698,7 +15698,7 @@
   <a:extraClrSchemeLst/>
   <a:extLst>
     <a:ext uri="{05A4C25C-085E-4340-85A3-A5531E510DB2}">
-      <thm15:themeFamily xmlns="" xmlns:thm15="http://schemas.microsoft.com/office/thememl/2012/main" name="Office Theme" id="{62F939B6-93AF-4DB8-9C6B-D6C7DFDC589F}" vid="{4A3C46E8-61CC-4603-A589-7422A47A8E4A}"/>
+      <thm15:themeFamily xmlns:thm15="http://schemas.microsoft.com/office/thememl/2012/main" xmlns="" name="Office Theme" id="{62F939B6-93AF-4DB8-9C6B-D6C7DFDC589F}" vid="{4A3C46E8-61CC-4603-A589-7422A47A8E4A}"/>
     </a:ext>
   </a:extLst>
 </a:theme>
@@ -15967,7 +15967,7 @@
   <a:extraClrSchemeLst/>
   <a:extLst>
     <a:ext uri="{05A4C25C-085E-4340-85A3-A5531E510DB2}">
-      <thm15:themeFamily xmlns="" xmlns:thm15="http://schemas.microsoft.com/office/thememl/2012/main" name="Office Theme" id="{62F939B6-93AF-4DB8-9C6B-D6C7DFDC589F}" vid="{4A3C46E8-61CC-4603-A589-7422A47A8E4A}"/>
+      <thm15:themeFamily xmlns:thm15="http://schemas.microsoft.com/office/thememl/2012/main" xmlns="" name="Office Theme" id="{62F939B6-93AF-4DB8-9C6B-D6C7DFDC589F}" vid="{4A3C46E8-61CC-4603-A589-7422A47A8E4A}"/>
     </a:ext>
   </a:extLst>
 </a:theme>
@@ -16262,7 +16262,7 @@
   <a:extraClrSchemeLst/>
   <a:extLst>
     <a:ext uri="{05A4C25C-085E-4340-85A3-A5531E510DB2}">
-      <thm15:themeFamily xmlns="" xmlns:thm15="http://schemas.microsoft.com/office/thememl/2012/main" name="Office Theme" id="{62F939B6-93AF-4DB8-9C6B-D6C7DFDC589F}" vid="{4A3C46E8-61CC-4603-A589-7422A47A8E4A}"/>
+      <thm15:themeFamily xmlns:thm15="http://schemas.microsoft.com/office/thememl/2012/main" xmlns="" name="Office Theme" id="{62F939B6-93AF-4DB8-9C6B-D6C7DFDC589F}" vid="{4A3C46E8-61CC-4603-A589-7422A47A8E4A}"/>
     </a:ext>
   </a:extLst>
 </a:theme>

</xml_diff>